<commit_message>
update presentation & minor changes in dialog.json
</commit_message>
<xml_diff>
--- a/Report/presentation_2_Diana.pptx
+++ b/Report/presentation_2_Diana.pptx
@@ -10,15 +10,15 @@
   <p:sldIdLst>
     <p:sldId id="256" r:id="rId2"/>
     <p:sldId id="257" r:id="rId3"/>
-    <p:sldId id="258" r:id="rId4"/>
-    <p:sldId id="259" r:id="rId5"/>
-    <p:sldId id="260" r:id="rId6"/>
-    <p:sldId id="262" r:id="rId7"/>
-    <p:sldId id="267" r:id="rId8"/>
-    <p:sldId id="266" r:id="rId9"/>
-    <p:sldId id="263" r:id="rId10"/>
-    <p:sldId id="264" r:id="rId11"/>
-    <p:sldId id="269" r:id="rId12"/>
+    <p:sldId id="269" r:id="rId4"/>
+    <p:sldId id="272" r:id="rId5"/>
+    <p:sldId id="271" r:id="rId6"/>
+    <p:sldId id="273" r:id="rId7"/>
+    <p:sldId id="274" r:id="rId8"/>
+    <p:sldId id="276" r:id="rId9"/>
+    <p:sldId id="277" r:id="rId10"/>
+    <p:sldId id="278" r:id="rId11"/>
+    <p:sldId id="275" r:id="rId12"/>
     <p:sldId id="268" r:id="rId13"/>
   </p:sldIdLst>
   <p:sldSz cx="12192000" cy="6858000"/>
@@ -208,7 +208,7 @@
           <a:p>
             <a:fld id="{FDDF5FE0-F804-4E91-803A-7CECEE48BB95}" type="datetimeFigureOut">
               <a:rPr lang="pt-PT" smtClean="0"/>
-              <a:t>27/03/2019</a:t>
+              <a:t>24/05/2019</a:t>
             </a:fld>
             <a:endParaRPr lang="pt-PT"/>
           </a:p>
@@ -559,356 +559,6 @@
 </p:notes>
 </file>
 
-<file path=ppt/notesSlides/notesSlide10.xml><?xml version="1.0" encoding="utf-8"?>
-<p:notes xmlns:a="http://schemas.openxmlformats.org/drawingml/2006/main" xmlns:r="http://schemas.openxmlformats.org/officeDocument/2006/relationships" xmlns:p="http://schemas.openxmlformats.org/presentationml/2006/main">
-  <p:cSld>
-    <p:spTree>
-      <p:nvGrpSpPr>
-        <p:cNvPr id="1" name=""/>
-        <p:cNvGrpSpPr/>
-        <p:nvPr/>
-      </p:nvGrpSpPr>
-      <p:grpSpPr>
-        <a:xfrm>
-          <a:off x="0" y="0"/>
-          <a:ext cx="0" cy="0"/>
-          <a:chOff x="0" y="0"/>
-          <a:chExt cx="0" cy="0"/>
-        </a:xfrm>
-      </p:grpSpPr>
-      <p:sp>
-        <p:nvSpPr>
-          <p:cNvPr id="2" name="Marcador de Posição da Imagem do Diapositivo 1"/>
-          <p:cNvSpPr>
-            <a:spLocks noGrp="1" noRot="1" noChangeAspect="1"/>
-          </p:cNvSpPr>
-          <p:nvPr>
-            <p:ph type="sldImg"/>
-          </p:nvPr>
-        </p:nvSpPr>
-        <p:spPr/>
-      </p:sp>
-      <p:sp>
-        <p:nvSpPr>
-          <p:cNvPr id="3" name="Marcador de Posição de Notas 2"/>
-          <p:cNvSpPr>
-            <a:spLocks noGrp="1"/>
-          </p:cNvSpPr>
-          <p:nvPr>
-            <p:ph type="body" idx="1"/>
-          </p:nvPr>
-        </p:nvSpPr>
-        <p:spPr/>
-        <p:txBody>
-          <a:bodyPr/>
-          <a:lstStyle/>
-          <a:p>
-            <a:r>
-              <a:rPr lang="pt-PT" dirty="0"/>
-              <a:t>GIL</a:t>
-            </a:r>
-          </a:p>
-          <a:p>
-            <a:endParaRPr lang="pt-PT" dirty="0"/>
-          </a:p>
-          <a:p>
-            <a:r>
-              <a:rPr lang="pt-PT" dirty="0"/>
-              <a:t>Ponto 2.1 – falar q </a:t>
-            </a:r>
-            <a:r>
-              <a:rPr lang="pt-PT" dirty="0" err="1"/>
-              <a:t>mongoDB</a:t>
-            </a:r>
-            <a:r>
-              <a:rPr lang="pt-PT" dirty="0"/>
-              <a:t> e parão alteram constantemente conforme regras e conforme vamos querendo eficiência</a:t>
-            </a:r>
-            <a:br>
-              <a:rPr lang="pt-PT" dirty="0"/>
-            </a:br>
-            <a:endParaRPr lang="pt-PT" dirty="0"/>
-          </a:p>
-          <a:p>
-            <a:r>
-              <a:rPr lang="pt-PT" dirty="0"/>
-              <a:t>Ponto 2.2 – dizer q árvore é o q permite escolher diálogo, com base em destreza e tal</a:t>
-            </a:r>
-          </a:p>
-          <a:p>
-            <a:endParaRPr lang="pt-PT" dirty="0"/>
-          </a:p>
-          <a:p>
-            <a:r>
-              <a:rPr lang="pt-PT" dirty="0"/>
-              <a:t>Ponto 2.3 – dizer que é supervisionada para já ?</a:t>
-            </a:r>
-            <a:br>
-              <a:rPr lang="pt-PT" dirty="0"/>
-            </a:br>
-            <a:br>
-              <a:rPr lang="pt-PT" dirty="0"/>
-            </a:br>
-            <a:r>
-              <a:rPr lang="pt-PT" dirty="0"/>
-              <a:t>Ponto 3 – dizer q basicamente temos que melhorar tudo o que temos acima</a:t>
-            </a:r>
-          </a:p>
-        </p:txBody>
-      </p:sp>
-      <p:sp>
-        <p:nvSpPr>
-          <p:cNvPr id="4" name="Marcador de Posição do Número do Diapositivo 3"/>
-          <p:cNvSpPr>
-            <a:spLocks noGrp="1"/>
-          </p:cNvSpPr>
-          <p:nvPr>
-            <p:ph type="sldNum" sz="quarter" idx="5"/>
-          </p:nvPr>
-        </p:nvSpPr>
-        <p:spPr/>
-        <p:txBody>
-          <a:bodyPr/>
-          <a:lstStyle/>
-          <a:p>
-            <a:fld id="{F9C76EEC-3DB8-4814-A8C5-185DA6C5A9E9}" type="slidenum">
-              <a:rPr lang="pt-PT" smtClean="0"/>
-              <a:t>10</a:t>
-            </a:fld>
-            <a:endParaRPr lang="pt-PT"/>
-          </a:p>
-        </p:txBody>
-      </p:sp>
-    </p:spTree>
-    <p:extLst>
-      <p:ext uri="{BB962C8B-B14F-4D97-AF65-F5344CB8AC3E}">
-        <p14:creationId xmlns:p14="http://schemas.microsoft.com/office/powerpoint/2010/main" val="2653281919"/>
-      </p:ext>
-    </p:extLst>
-  </p:cSld>
-  <p:clrMapOvr>
-    <a:masterClrMapping/>
-  </p:clrMapOvr>
-</p:notes>
-</file>
-
-<file path=ppt/notesSlides/notesSlide11.xml><?xml version="1.0" encoding="utf-8"?>
-<p:notes xmlns:a="http://schemas.openxmlformats.org/drawingml/2006/main" xmlns:r="http://schemas.openxmlformats.org/officeDocument/2006/relationships" xmlns:p="http://schemas.openxmlformats.org/presentationml/2006/main">
-  <p:cSld>
-    <p:spTree>
-      <p:nvGrpSpPr>
-        <p:cNvPr id="1" name=""/>
-        <p:cNvGrpSpPr/>
-        <p:nvPr/>
-      </p:nvGrpSpPr>
-      <p:grpSpPr>
-        <a:xfrm>
-          <a:off x="0" y="0"/>
-          <a:ext cx="0" cy="0"/>
-          <a:chOff x="0" y="0"/>
-          <a:chExt cx="0" cy="0"/>
-        </a:xfrm>
-      </p:grpSpPr>
-      <p:sp>
-        <p:nvSpPr>
-          <p:cNvPr id="2" name="Marcador de Posição da Imagem do Diapositivo 1"/>
-          <p:cNvSpPr>
-            <a:spLocks noGrp="1" noRot="1" noChangeAspect="1"/>
-          </p:cNvSpPr>
-          <p:nvPr>
-            <p:ph type="sldImg"/>
-          </p:nvPr>
-        </p:nvSpPr>
-        <p:spPr/>
-      </p:sp>
-      <p:sp>
-        <p:nvSpPr>
-          <p:cNvPr id="3" name="Marcador de Posição de Notas 2"/>
-          <p:cNvSpPr>
-            <a:spLocks noGrp="1"/>
-          </p:cNvSpPr>
-          <p:nvPr>
-            <p:ph type="body" idx="1"/>
-          </p:nvPr>
-        </p:nvSpPr>
-        <p:spPr/>
-        <p:txBody>
-          <a:bodyPr/>
-          <a:lstStyle/>
-          <a:p>
-            <a:r>
-              <a:rPr lang="pt-PT" dirty="0"/>
-              <a:t>GIL</a:t>
-            </a:r>
-          </a:p>
-          <a:p>
-            <a:endParaRPr lang="pt-PT" dirty="0"/>
-          </a:p>
-          <a:p>
-            <a:r>
-              <a:rPr lang="pt-PT" dirty="0"/>
-              <a:t>Ponto 2.1 – falar q </a:t>
-            </a:r>
-            <a:r>
-              <a:rPr lang="pt-PT" dirty="0" err="1"/>
-              <a:t>mongoDB</a:t>
-            </a:r>
-            <a:r>
-              <a:rPr lang="pt-PT" dirty="0"/>
-              <a:t> e parão alteram constantemente conforme regras e conforme vamos querendo eficiência</a:t>
-            </a:r>
-            <a:br>
-              <a:rPr lang="pt-PT" dirty="0"/>
-            </a:br>
-            <a:endParaRPr lang="pt-PT" dirty="0"/>
-          </a:p>
-          <a:p>
-            <a:r>
-              <a:rPr lang="pt-PT" dirty="0"/>
-              <a:t>Ponto 2.2 – dizer q árvore é o q permite escolher diálogo, com base em destreza e tal</a:t>
-            </a:r>
-          </a:p>
-          <a:p>
-            <a:endParaRPr lang="pt-PT" dirty="0"/>
-          </a:p>
-          <a:p>
-            <a:r>
-              <a:rPr lang="pt-PT" dirty="0"/>
-              <a:t>Ponto 2.3 – dizer que é supervisionada para já ?</a:t>
-            </a:r>
-            <a:br>
-              <a:rPr lang="pt-PT" dirty="0"/>
-            </a:br>
-            <a:br>
-              <a:rPr lang="pt-PT" dirty="0"/>
-            </a:br>
-            <a:r>
-              <a:rPr lang="pt-PT" dirty="0"/>
-              <a:t>Ponto 3 – dizer q basicamente temos que melhorar tudo o que temos acima</a:t>
-            </a:r>
-          </a:p>
-        </p:txBody>
-      </p:sp>
-      <p:sp>
-        <p:nvSpPr>
-          <p:cNvPr id="4" name="Marcador de Posição do Número do Diapositivo 3"/>
-          <p:cNvSpPr>
-            <a:spLocks noGrp="1"/>
-          </p:cNvSpPr>
-          <p:nvPr>
-            <p:ph type="sldNum" sz="quarter" idx="5"/>
-          </p:nvPr>
-        </p:nvSpPr>
-        <p:spPr/>
-        <p:txBody>
-          <a:bodyPr/>
-          <a:lstStyle/>
-          <a:p>
-            <a:fld id="{F9C76EEC-3DB8-4814-A8C5-185DA6C5A9E9}" type="slidenum">
-              <a:rPr lang="pt-PT" smtClean="0"/>
-              <a:t>11</a:t>
-            </a:fld>
-            <a:endParaRPr lang="pt-PT"/>
-          </a:p>
-        </p:txBody>
-      </p:sp>
-    </p:spTree>
-    <p:extLst>
-      <p:ext uri="{BB962C8B-B14F-4D97-AF65-F5344CB8AC3E}">
-        <p14:creationId xmlns:p14="http://schemas.microsoft.com/office/powerpoint/2010/main" val="2155469764"/>
-      </p:ext>
-    </p:extLst>
-  </p:cSld>
-  <p:clrMapOvr>
-    <a:masterClrMapping/>
-  </p:clrMapOvr>
-</p:notes>
-</file>
-
-<file path=ppt/notesSlides/notesSlide12.xml><?xml version="1.0" encoding="utf-8"?>
-<p:notes xmlns:a="http://schemas.openxmlformats.org/drawingml/2006/main" xmlns:r="http://schemas.openxmlformats.org/officeDocument/2006/relationships" xmlns:p="http://schemas.openxmlformats.org/presentationml/2006/main">
-  <p:cSld>
-    <p:spTree>
-      <p:nvGrpSpPr>
-        <p:cNvPr id="1" name=""/>
-        <p:cNvGrpSpPr/>
-        <p:nvPr/>
-      </p:nvGrpSpPr>
-      <p:grpSpPr>
-        <a:xfrm>
-          <a:off x="0" y="0"/>
-          <a:ext cx="0" cy="0"/>
-          <a:chOff x="0" y="0"/>
-          <a:chExt cx="0" cy="0"/>
-        </a:xfrm>
-      </p:grpSpPr>
-      <p:sp>
-        <p:nvSpPr>
-          <p:cNvPr id="2" name="Slide Image Placeholder 1"/>
-          <p:cNvSpPr>
-            <a:spLocks noGrp="1" noRot="1" noChangeAspect="1"/>
-          </p:cNvSpPr>
-          <p:nvPr>
-            <p:ph type="sldImg"/>
-          </p:nvPr>
-        </p:nvSpPr>
-        <p:spPr/>
-      </p:sp>
-      <p:sp>
-        <p:nvSpPr>
-          <p:cNvPr id="3" name="Notes Placeholder 2"/>
-          <p:cNvSpPr>
-            <a:spLocks noGrp="1"/>
-          </p:cNvSpPr>
-          <p:nvPr>
-            <p:ph type="body" idx="1"/>
-          </p:nvPr>
-        </p:nvSpPr>
-        <p:spPr/>
-        <p:txBody>
-          <a:bodyPr/>
-          <a:lstStyle/>
-          <a:p>
-            <a:endParaRPr lang="pt-PT" dirty="0"/>
-          </a:p>
-        </p:txBody>
-      </p:sp>
-      <p:sp>
-        <p:nvSpPr>
-          <p:cNvPr id="4" name="Slide Number Placeholder 3"/>
-          <p:cNvSpPr>
-            <a:spLocks noGrp="1"/>
-          </p:cNvSpPr>
-          <p:nvPr>
-            <p:ph type="sldNum" sz="quarter" idx="10"/>
-          </p:nvPr>
-        </p:nvSpPr>
-        <p:spPr/>
-        <p:txBody>
-          <a:bodyPr/>
-          <a:lstStyle/>
-          <a:p>
-            <a:fld id="{F9C76EEC-3DB8-4814-A8C5-185DA6C5A9E9}" type="slidenum">
-              <a:rPr lang="pt-PT" smtClean="0"/>
-              <a:t>12</a:t>
-            </a:fld>
-            <a:endParaRPr lang="pt-PT"/>
-          </a:p>
-        </p:txBody>
-      </p:sp>
-    </p:spTree>
-    <p:extLst>
-      <p:ext uri="{BB962C8B-B14F-4D97-AF65-F5344CB8AC3E}">
-        <p14:creationId xmlns:p14="http://schemas.microsoft.com/office/powerpoint/2010/main" val="2587704403"/>
-      </p:ext>
-    </p:extLst>
-  </p:cSld>
-  <p:clrMapOvr>
-    <a:masterClrMapping/>
-  </p:clrMapOvr>
-</p:notes>
-</file>
-
 <file path=ppt/notesSlides/notesSlide2.xml><?xml version="1.0" encoding="utf-8"?>
 <p:notes xmlns:a="http://schemas.openxmlformats.org/drawingml/2006/main" xmlns:r="http://schemas.openxmlformats.org/officeDocument/2006/relationships" xmlns:p="http://schemas.openxmlformats.org/presentationml/2006/main">
   <p:cSld>
@@ -1054,76 +704,7 @@
           <a:bodyPr/>
           <a:lstStyle/>
           <a:p>
-            <a:r>
-              <a:rPr lang="pt-PT" dirty="0"/>
-              <a:t>LUIS</a:t>
-            </a:r>
-          </a:p>
-          <a:p>
             <a:endParaRPr lang="pt-PT" dirty="0"/>
-          </a:p>
-          <a:p>
-            <a:r>
-              <a:rPr lang="pt-PT" dirty="0"/>
-              <a:t>Ponto 1 – falar também do exemplo de matemática (geometria, trigonometria,…) para encher</a:t>
-            </a:r>
-          </a:p>
-          <a:p>
-            <a:r>
-              <a:rPr lang="pt-PT" dirty="0"/>
-              <a:t> </a:t>
-            </a:r>
-          </a:p>
-          <a:p>
-            <a:r>
-              <a:rPr lang="pt-PT" dirty="0"/>
-              <a:t>Ponto 2 – 	aluno = utilizador</a:t>
-            </a:r>
-          </a:p>
-          <a:p>
-            <a:r>
-              <a:rPr lang="pt-PT" dirty="0"/>
-              <a:t>     	2.1 Explicar o que é a destreza (media tempo global a responder) e o desempenho(percentagem de respostas certas dentro de todas q já respondeu)</a:t>
-            </a:r>
-          </a:p>
-          <a:p>
-            <a:r>
-              <a:rPr lang="pt-PT" dirty="0"/>
-              <a:t>	2.1 falar do desempenho geral na realização de vários testes, como soma de desempenho de testes individuais</a:t>
-            </a:r>
-            <a:br>
-              <a:rPr lang="pt-PT" dirty="0"/>
-            </a:br>
-            <a:r>
-              <a:rPr lang="pt-PT" dirty="0"/>
-              <a:t>                	2.2 dizer que cada aluno tem sensibilidades diferentes e tal FUTURO, mas para já está adaptado a os dados de cada aluno (performance)</a:t>
-            </a:r>
-            <a:br>
-              <a:rPr lang="pt-PT" dirty="0"/>
-            </a:br>
-            <a:endParaRPr lang="pt-PT" dirty="0"/>
-          </a:p>
-          <a:p>
-            <a:r>
-              <a:rPr lang="pt-PT" dirty="0"/>
-              <a:t>Ponto 3 -  dizer que não se queria apenas o típico </a:t>
-            </a:r>
-            <a:r>
-              <a:rPr lang="pt-PT" dirty="0" err="1"/>
-              <a:t>chatbox</a:t>
-            </a:r>
-            <a:r>
-              <a:rPr lang="pt-PT" dirty="0"/>
-              <a:t> chato, mas um “</a:t>
-            </a:r>
-            <a:r>
-              <a:rPr lang="pt-PT" dirty="0" err="1"/>
-              <a:t>bot</a:t>
-            </a:r>
-            <a:r>
-              <a:rPr lang="pt-PT" dirty="0"/>
-              <a:t>” cativante e adequado a cada aluno</a:t>
-            </a:r>
           </a:p>
         </p:txBody>
       </p:sp>
@@ -1153,7 +734,7 @@
     </p:spTree>
     <p:extLst>
       <p:ext uri="{BB962C8B-B14F-4D97-AF65-F5344CB8AC3E}">
-        <p14:creationId xmlns:p14="http://schemas.microsoft.com/office/powerpoint/2010/main" val="2884616700"/>
+        <p14:creationId xmlns:p14="http://schemas.microsoft.com/office/powerpoint/2010/main" val="2155469764"/>
       </p:ext>
     </p:extLst>
   </p:cSld>
@@ -1207,29 +788,6 @@
           <a:bodyPr/>
           <a:lstStyle/>
           <a:p>
-            <a:pPr marL="0" marR="0" lvl="0" indent="0" algn="l" defTabSz="914400" rtl="0" eaLnBrk="1" fontAlgn="auto" latinLnBrk="0" hangingPunct="1">
-              <a:lnSpc>
-                <a:spcPct val="100000"/>
-              </a:lnSpc>
-              <a:spcBef>
-                <a:spcPts val="0"/>
-              </a:spcBef>
-              <a:spcAft>
-                <a:spcPts val="0"/>
-              </a:spcAft>
-              <a:buClrTx/>
-              <a:buSzTx/>
-              <a:buFontTx/>
-              <a:buNone/>
-              <a:tabLst/>
-              <a:defRPr/>
-            </a:pPr>
-            <a:r>
-              <a:rPr lang="pt-PT" dirty="0"/>
-              <a:t>LUIS</a:t>
-            </a:r>
-          </a:p>
-          <a:p>
             <a:endParaRPr lang="pt-PT" dirty="0"/>
           </a:p>
         </p:txBody>
@@ -1251,7 +809,7 @@
           <a:p>
             <a:fld id="{F9C76EEC-3DB8-4814-A8C5-185DA6C5A9E9}" type="slidenum">
               <a:rPr lang="pt-PT" smtClean="0"/>
-              <a:t>4</a:t>
+              <a:t>11</a:t>
             </a:fld>
             <a:endParaRPr lang="pt-PT"/>
           </a:p>
@@ -1260,7 +818,7 @@
     </p:spTree>
     <p:extLst>
       <p:ext uri="{BB962C8B-B14F-4D97-AF65-F5344CB8AC3E}">
-        <p14:creationId xmlns:p14="http://schemas.microsoft.com/office/powerpoint/2010/main" val="2542676790"/>
+        <p14:creationId xmlns:p14="http://schemas.microsoft.com/office/powerpoint/2010/main" val="2303373365"/>
       </p:ext>
     </p:extLst>
   </p:cSld>
@@ -1289,7 +847,7 @@
       </p:grpSpPr>
       <p:sp>
         <p:nvSpPr>
-          <p:cNvPr id="2" name="Marcador de Posição da Imagem do Diapositivo 1"/>
+          <p:cNvPr id="2" name="Slide Image Placeholder 1"/>
           <p:cNvSpPr>
             <a:spLocks noGrp="1" noRot="1" noChangeAspect="1"/>
           </p:cNvSpPr>
@@ -1301,7 +859,7 @@
       </p:sp>
       <p:sp>
         <p:nvSpPr>
-          <p:cNvPr id="3" name="Marcador de Posição de Notas 2"/>
+          <p:cNvPr id="3" name="Notes Placeholder 2"/>
           <p:cNvSpPr>
             <a:spLocks noGrp="1"/>
           </p:cNvSpPr>
@@ -1314,57 +872,18 @@
           <a:bodyPr/>
           <a:lstStyle/>
           <a:p>
-            <a:pPr marL="0" marR="0" lvl="0" indent="0" algn="l" defTabSz="914400" rtl="0" eaLnBrk="1" fontAlgn="auto" latinLnBrk="0" hangingPunct="1">
-              <a:lnSpc>
-                <a:spcPct val="100000"/>
-              </a:lnSpc>
-              <a:spcBef>
-                <a:spcPts val="0"/>
-              </a:spcBef>
-              <a:spcAft>
-                <a:spcPts val="0"/>
-              </a:spcAft>
-              <a:buClrTx/>
-              <a:buSzTx/>
-              <a:buFontTx/>
-              <a:buNone/>
-              <a:tabLst/>
-              <a:defRPr/>
-            </a:pPr>
-            <a:r>
-              <a:rPr lang="pt-PT" dirty="0"/>
-              <a:t>LUIS</a:t>
-            </a:r>
-          </a:p>
-          <a:p>
             <a:endParaRPr lang="pt-PT" dirty="0"/>
           </a:p>
-          <a:p>
-            <a:r>
-              <a:rPr lang="pt-PT" dirty="0"/>
-              <a:t>Ponto 1: salientar que a existência dos outros módulos por estarmos a trabalhar em conjunto com outro projeto</a:t>
-            </a:r>
-            <a:br>
-              <a:rPr lang="pt-PT" dirty="0"/>
-            </a:br>
-            <a:br>
-              <a:rPr lang="pt-PT" dirty="0"/>
-            </a:br>
-            <a:r>
-              <a:rPr lang="pt-PT" dirty="0"/>
-              <a:t>Ponto 2: exemplificar domínio e subdomínio</a:t>
-            </a:r>
-          </a:p>
-        </p:txBody>
-      </p:sp>
-      <p:sp>
-        <p:nvSpPr>
-          <p:cNvPr id="4" name="Marcador de Posição do Número do Diapositivo 3"/>
-          <p:cNvSpPr>
-            <a:spLocks noGrp="1"/>
-          </p:cNvSpPr>
-          <p:nvPr>
-            <p:ph type="sldNum" sz="quarter" idx="5"/>
+        </p:txBody>
+      </p:sp>
+      <p:sp>
+        <p:nvSpPr>
+          <p:cNvPr id="4" name="Slide Number Placeholder 3"/>
+          <p:cNvSpPr>
+            <a:spLocks noGrp="1"/>
+          </p:cNvSpPr>
+          <p:nvPr>
+            <p:ph type="sldNum" sz="quarter" idx="10"/>
           </p:nvPr>
         </p:nvSpPr>
         <p:spPr/>
@@ -1374,7 +893,7 @@
           <a:p>
             <a:fld id="{F9C76EEC-3DB8-4814-A8C5-185DA6C5A9E9}" type="slidenum">
               <a:rPr lang="pt-PT" smtClean="0"/>
-              <a:t>5</a:t>
+              <a:t>12</a:t>
             </a:fld>
             <a:endParaRPr lang="pt-PT"/>
           </a:p>
@@ -1383,839 +902,7 @@
     </p:spTree>
     <p:extLst>
       <p:ext uri="{BB962C8B-B14F-4D97-AF65-F5344CB8AC3E}">
-        <p14:creationId xmlns:p14="http://schemas.microsoft.com/office/powerpoint/2010/main" val="1200589705"/>
-      </p:ext>
-    </p:extLst>
-  </p:cSld>
-  <p:clrMapOvr>
-    <a:masterClrMapping/>
-  </p:clrMapOvr>
-</p:notes>
-</file>
-
-<file path=ppt/notesSlides/notesSlide6.xml><?xml version="1.0" encoding="utf-8"?>
-<p:notes xmlns:a="http://schemas.openxmlformats.org/drawingml/2006/main" xmlns:r="http://schemas.openxmlformats.org/officeDocument/2006/relationships" xmlns:p="http://schemas.openxmlformats.org/presentationml/2006/main">
-  <p:cSld>
-    <p:spTree>
-      <p:nvGrpSpPr>
-        <p:cNvPr id="1" name=""/>
-        <p:cNvGrpSpPr/>
-        <p:nvPr/>
-      </p:nvGrpSpPr>
-      <p:grpSpPr>
-        <a:xfrm>
-          <a:off x="0" y="0"/>
-          <a:ext cx="0" cy="0"/>
-          <a:chOff x="0" y="0"/>
-          <a:chExt cx="0" cy="0"/>
-        </a:xfrm>
-      </p:grpSpPr>
-      <p:sp>
-        <p:nvSpPr>
-          <p:cNvPr id="2" name="Marcador de Posição da Imagem do Diapositivo 1"/>
-          <p:cNvSpPr>
-            <a:spLocks noGrp="1" noRot="1" noChangeAspect="1"/>
-          </p:cNvSpPr>
-          <p:nvPr>
-            <p:ph type="sldImg"/>
-          </p:nvPr>
-        </p:nvSpPr>
-        <p:spPr/>
-      </p:sp>
-      <p:sp>
-        <p:nvSpPr>
-          <p:cNvPr id="3" name="Marcador de Posição de Notas 2"/>
-          <p:cNvSpPr>
-            <a:spLocks noGrp="1"/>
-          </p:cNvSpPr>
-          <p:nvPr>
-            <p:ph type="body" idx="1"/>
-          </p:nvPr>
-        </p:nvSpPr>
-        <p:spPr/>
-        <p:txBody>
-          <a:bodyPr/>
-          <a:lstStyle/>
-          <a:p>
-            <a:r>
-              <a:rPr lang="pt-PT" dirty="0"/>
-              <a:t>DIANA</a:t>
-            </a:r>
-          </a:p>
-          <a:p>
-            <a:endParaRPr lang="pt-PT" dirty="0"/>
-          </a:p>
-          <a:p>
-            <a:pPr marL="0" marR="0" lvl="0" indent="0" algn="l" defTabSz="914400" rtl="0" eaLnBrk="1" fontAlgn="auto" latinLnBrk="0" hangingPunct="1">
-              <a:lnSpc>
-                <a:spcPct val="100000"/>
-              </a:lnSpc>
-              <a:spcBef>
-                <a:spcPts val="0"/>
-              </a:spcBef>
-              <a:spcAft>
-                <a:spcPts val="0"/>
-              </a:spcAft>
-              <a:buClrTx/>
-              <a:buSzTx/>
-              <a:buFontTx/>
-              <a:buNone/>
-              <a:tabLst/>
-              <a:defRPr/>
-            </a:pPr>
-            <a:r>
-              <a:rPr lang="pt-PT" dirty="0"/>
-              <a:t>&gt;&gt; apresentação geral das funcionalidades do componente.</a:t>
-            </a:r>
-          </a:p>
-          <a:p>
-            <a:pPr marL="0" marR="0" lvl="0" indent="0" algn="l" defTabSz="914400" rtl="0" eaLnBrk="1" fontAlgn="auto" latinLnBrk="0" hangingPunct="1">
-              <a:lnSpc>
-                <a:spcPct val="100000"/>
-              </a:lnSpc>
-              <a:spcBef>
-                <a:spcPts val="0"/>
-              </a:spcBef>
-              <a:spcAft>
-                <a:spcPts val="0"/>
-              </a:spcAft>
-              <a:buClrTx/>
-              <a:buSzTx/>
-              <a:buFontTx/>
-              <a:buNone/>
-              <a:tabLst/>
-              <a:defRPr/>
-            </a:pPr>
-            <a:endParaRPr lang="pt-PT" dirty="0"/>
-          </a:p>
-          <a:p>
-            <a:pPr marL="0" marR="0" lvl="0" indent="0" algn="l" defTabSz="914400" rtl="0" eaLnBrk="1" fontAlgn="auto" latinLnBrk="0" hangingPunct="1">
-              <a:lnSpc>
-                <a:spcPct val="100000"/>
-              </a:lnSpc>
-              <a:spcBef>
-                <a:spcPts val="0"/>
-              </a:spcBef>
-              <a:spcAft>
-                <a:spcPts val="0"/>
-              </a:spcAft>
-              <a:buClrTx/>
-              <a:buSzTx/>
-              <a:buFontTx/>
-              <a:buNone/>
-              <a:tabLst/>
-              <a:defRPr/>
-            </a:pPr>
-            <a:r>
-              <a:rPr lang="pt-PT" dirty="0"/>
-              <a:t>	COMPONENTE  NOSSA --- ESTÁ INTEGRADA NOUTRAS  como BD &amp; PROFILER</a:t>
-            </a:r>
-            <a:br>
-              <a:rPr lang="pt-PT" dirty="0"/>
-            </a:br>
-            <a:r>
-              <a:rPr lang="pt-PT" dirty="0"/>
-              <a:t>Ponto 1.1 – dizer que vem do </a:t>
-            </a:r>
-            <a:r>
-              <a:rPr lang="pt-PT" dirty="0" err="1"/>
-              <a:t>profiler</a:t>
-            </a:r>
-            <a:r>
-              <a:rPr lang="pt-PT" dirty="0"/>
-              <a:t> (PADRAO em JSON / VETOR DE INFO) –convertemos os valores do padrão noutros valores, segundo os intervalos estabelecidos por</a:t>
-            </a:r>
-            <a:br>
-              <a:rPr lang="pt-PT" dirty="0"/>
-            </a:br>
-            <a:r>
-              <a:rPr lang="pt-PT" dirty="0"/>
-              <a:t>                   nós.</a:t>
-            </a:r>
-          </a:p>
-          <a:p>
-            <a:r>
-              <a:rPr lang="pt-PT" dirty="0"/>
-              <a:t>                –  definir “informação útil” (dados do aluno como performance, se acertou ou errou ultima pergunta,…)</a:t>
-            </a:r>
-          </a:p>
-          <a:p>
-            <a:endParaRPr lang="pt-PT" dirty="0"/>
-          </a:p>
-          <a:p>
-            <a:r>
-              <a:rPr lang="pt-PT" dirty="0"/>
-              <a:t>Ponto 1.2 – explicar que analisamos esses valores e testamos contra as regras estabelecidas por nós, respetivas a cada um dos </a:t>
-            </a:r>
-            <a:r>
-              <a:rPr lang="pt-PT" dirty="0" err="1"/>
-              <a:t>dominios</a:t>
-            </a:r>
-            <a:r>
-              <a:rPr lang="pt-PT" dirty="0"/>
-              <a:t>.</a:t>
-            </a:r>
-          </a:p>
-          <a:p>
-            <a:endParaRPr lang="pt-PT" dirty="0"/>
-          </a:p>
-          <a:p>
-            <a:r>
-              <a:rPr lang="pt-PT" dirty="0"/>
-              <a:t>Ponto 1.3 – dizer que a regra acionada (cujas condições são satisfeitas pelos valores) vai ditar qual o tipo de frase a apresentar ao utilizador</a:t>
-            </a:r>
-            <a:br>
-              <a:rPr lang="pt-PT" dirty="0"/>
-            </a:br>
-            <a:endParaRPr lang="pt-PT" dirty="0"/>
-          </a:p>
-        </p:txBody>
-      </p:sp>
-      <p:sp>
-        <p:nvSpPr>
-          <p:cNvPr id="4" name="Marcador de Posição do Número do Diapositivo 3"/>
-          <p:cNvSpPr>
-            <a:spLocks noGrp="1"/>
-          </p:cNvSpPr>
-          <p:nvPr>
-            <p:ph type="sldNum" sz="quarter" idx="5"/>
-          </p:nvPr>
-        </p:nvSpPr>
-        <p:spPr/>
-        <p:txBody>
-          <a:bodyPr/>
-          <a:lstStyle/>
-          <a:p>
-            <a:fld id="{F9C76EEC-3DB8-4814-A8C5-185DA6C5A9E9}" type="slidenum">
-              <a:rPr lang="pt-PT" smtClean="0"/>
-              <a:t>6</a:t>
-            </a:fld>
-            <a:endParaRPr lang="pt-PT"/>
-          </a:p>
-        </p:txBody>
-      </p:sp>
-    </p:spTree>
-    <p:extLst>
-      <p:ext uri="{BB962C8B-B14F-4D97-AF65-F5344CB8AC3E}">
-        <p14:creationId xmlns:p14="http://schemas.microsoft.com/office/powerpoint/2010/main" val="1112323880"/>
-      </p:ext>
-    </p:extLst>
-  </p:cSld>
-  <p:clrMapOvr>
-    <a:masterClrMapping/>
-  </p:clrMapOvr>
-</p:notes>
-</file>
-
-<file path=ppt/notesSlides/notesSlide7.xml><?xml version="1.0" encoding="utf-8"?>
-<p:notes xmlns:a="http://schemas.openxmlformats.org/drawingml/2006/main" xmlns:r="http://schemas.openxmlformats.org/officeDocument/2006/relationships" xmlns:p="http://schemas.openxmlformats.org/presentationml/2006/main">
-  <p:cSld>
-    <p:spTree>
-      <p:nvGrpSpPr>
-        <p:cNvPr id="1" name=""/>
-        <p:cNvGrpSpPr/>
-        <p:nvPr/>
-      </p:nvGrpSpPr>
-      <p:grpSpPr>
-        <a:xfrm>
-          <a:off x="0" y="0"/>
-          <a:ext cx="0" cy="0"/>
-          <a:chOff x="0" y="0"/>
-          <a:chExt cx="0" cy="0"/>
-        </a:xfrm>
-      </p:grpSpPr>
-      <p:sp>
-        <p:nvSpPr>
-          <p:cNvPr id="2" name="Marcador de Posição da Imagem do Diapositivo 1"/>
-          <p:cNvSpPr>
-            <a:spLocks noGrp="1" noRot="1" noChangeAspect="1"/>
-          </p:cNvSpPr>
-          <p:nvPr>
-            <p:ph type="sldImg"/>
-          </p:nvPr>
-        </p:nvSpPr>
-        <p:spPr/>
-      </p:sp>
-      <p:sp>
-        <p:nvSpPr>
-          <p:cNvPr id="3" name="Marcador de Posição de Notas 2"/>
-          <p:cNvSpPr>
-            <a:spLocks noGrp="1"/>
-          </p:cNvSpPr>
-          <p:nvPr>
-            <p:ph type="body" idx="1"/>
-          </p:nvPr>
-        </p:nvSpPr>
-        <p:spPr/>
-        <p:txBody>
-          <a:bodyPr/>
-          <a:lstStyle/>
-          <a:p>
-            <a:r>
-              <a:rPr lang="pt-PT" dirty="0"/>
-              <a:t>DIANA</a:t>
-            </a:r>
-          </a:p>
-          <a:p>
-            <a:endParaRPr lang="pt-PT" dirty="0"/>
-          </a:p>
-          <a:p>
-            <a:r>
-              <a:rPr lang="pt-PT" dirty="0"/>
-              <a:t>&gt;&gt; descrição de como o componente atua dentro do sistema global </a:t>
-            </a:r>
-          </a:p>
-          <a:p>
-            <a:r>
-              <a:rPr lang="pt-PT" dirty="0"/>
-              <a:t>---- dizer que não tratamos de ir buscar as perguntas da matéria à BD nem somos o </a:t>
-            </a:r>
-            <a:r>
-              <a:rPr lang="pt-PT" dirty="0" err="1"/>
-              <a:t>profiler</a:t>
-            </a:r>
-            <a:r>
-              <a:rPr lang="pt-PT" dirty="0"/>
-              <a:t>, apenas somos responsáveis pelas frases de diálogo com o aluno</a:t>
-            </a:r>
-          </a:p>
-          <a:p>
-            <a:r>
-              <a:rPr lang="pt-PT" dirty="0"/>
-              <a:t>&gt;&gt; arquitetura básica do componente e sua interação com os outros módulos</a:t>
-            </a:r>
-            <a:br>
-              <a:rPr lang="pt-PT" dirty="0"/>
-            </a:br>
-            <a:r>
-              <a:rPr lang="pt-PT" dirty="0"/>
-              <a:t>---- imagem</a:t>
-            </a:r>
-          </a:p>
-          <a:p>
-            <a:endParaRPr lang="pt-PT" dirty="0"/>
-          </a:p>
-        </p:txBody>
-      </p:sp>
-      <p:sp>
-        <p:nvSpPr>
-          <p:cNvPr id="4" name="Marcador de Posição do Número do Diapositivo 3"/>
-          <p:cNvSpPr>
-            <a:spLocks noGrp="1"/>
-          </p:cNvSpPr>
-          <p:nvPr>
-            <p:ph type="sldNum" sz="quarter" idx="5"/>
-          </p:nvPr>
-        </p:nvSpPr>
-        <p:spPr/>
-        <p:txBody>
-          <a:bodyPr/>
-          <a:lstStyle/>
-          <a:p>
-            <a:fld id="{F9C76EEC-3DB8-4814-A8C5-185DA6C5A9E9}" type="slidenum">
-              <a:rPr lang="pt-PT" smtClean="0"/>
-              <a:t>7</a:t>
-            </a:fld>
-            <a:endParaRPr lang="pt-PT"/>
-          </a:p>
-        </p:txBody>
-      </p:sp>
-    </p:spTree>
-    <p:extLst>
-      <p:ext uri="{BB962C8B-B14F-4D97-AF65-F5344CB8AC3E}">
-        <p14:creationId xmlns:p14="http://schemas.microsoft.com/office/powerpoint/2010/main" val="3339019805"/>
-      </p:ext>
-    </p:extLst>
-  </p:cSld>
-  <p:clrMapOvr>
-    <a:masterClrMapping/>
-  </p:clrMapOvr>
-</p:notes>
-</file>
-
-<file path=ppt/notesSlides/notesSlide8.xml><?xml version="1.0" encoding="utf-8"?>
-<p:notes xmlns:a="http://schemas.openxmlformats.org/drawingml/2006/main" xmlns:r="http://schemas.openxmlformats.org/officeDocument/2006/relationships" xmlns:p="http://schemas.openxmlformats.org/presentationml/2006/main">
-  <p:cSld>
-    <p:spTree>
-      <p:nvGrpSpPr>
-        <p:cNvPr id="1" name=""/>
-        <p:cNvGrpSpPr/>
-        <p:nvPr/>
-      </p:nvGrpSpPr>
-      <p:grpSpPr>
-        <a:xfrm>
-          <a:off x="0" y="0"/>
-          <a:ext cx="0" cy="0"/>
-          <a:chOff x="0" y="0"/>
-          <a:chExt cx="0" cy="0"/>
-        </a:xfrm>
-      </p:grpSpPr>
-      <p:sp>
-        <p:nvSpPr>
-          <p:cNvPr id="2" name="Marcador de Posição da Imagem do Diapositivo 1"/>
-          <p:cNvSpPr>
-            <a:spLocks noGrp="1" noRot="1" noChangeAspect="1"/>
-          </p:cNvSpPr>
-          <p:nvPr>
-            <p:ph type="sldImg"/>
-          </p:nvPr>
-        </p:nvSpPr>
-        <p:spPr/>
-      </p:sp>
-      <p:sp>
-        <p:nvSpPr>
-          <p:cNvPr id="3" name="Marcador de Posição de Notas 2"/>
-          <p:cNvSpPr>
-            <a:spLocks noGrp="1"/>
-          </p:cNvSpPr>
-          <p:nvPr>
-            <p:ph type="body" idx="1"/>
-          </p:nvPr>
-        </p:nvSpPr>
-        <p:spPr/>
-        <p:txBody>
-          <a:bodyPr/>
-          <a:lstStyle/>
-          <a:p>
-            <a:r>
-              <a:rPr lang="pt-PT" dirty="0"/>
-              <a:t>DIANA</a:t>
-            </a:r>
-          </a:p>
-          <a:p>
-            <a:endParaRPr lang="pt-PT" dirty="0"/>
-          </a:p>
-          <a:p>
-            <a:r>
-              <a:rPr lang="pt-PT" dirty="0"/>
-              <a:t>&gt;&gt; apresentação de um pequeno excerto da base de dados das frases e da sua informação de suporte.</a:t>
-            </a:r>
-          </a:p>
-          <a:p>
-            <a:r>
-              <a:rPr lang="pt-PT" dirty="0"/>
-              <a:t>&gt;&gt; exemplo de um diálogo suportado pelo sistema.</a:t>
-            </a:r>
-          </a:p>
-          <a:p>
-            <a:r>
-              <a:rPr lang="pt-PT" dirty="0"/>
-              <a:t>&gt;&gt; explicar </a:t>
-            </a:r>
-            <a:r>
-              <a:rPr lang="pt-PT" dirty="0" err="1"/>
-              <a:t>tags</a:t>
-            </a:r>
-            <a:r>
-              <a:rPr lang="pt-PT" dirty="0"/>
-              <a:t> (</a:t>
-            </a:r>
-            <a:r>
-              <a:rPr lang="pt-PT" dirty="0" err="1"/>
-              <a:t>greetings</a:t>
-            </a:r>
-            <a:r>
-              <a:rPr lang="pt-PT" dirty="0"/>
-              <a:t>, </a:t>
-            </a:r>
-            <a:r>
-              <a:rPr lang="pt-PT" dirty="0" err="1"/>
-              <a:t>funny</a:t>
-            </a:r>
-            <a:r>
-              <a:rPr lang="pt-PT"/>
-              <a:t> [ESTADOS ESPIRITO LEONARDO], </a:t>
-            </a:r>
-            <a:r>
-              <a:rPr lang="pt-PT" dirty="0" err="1"/>
-              <a:t>phrase</a:t>
-            </a:r>
-            <a:r>
-              <a:rPr lang="pt-PT" dirty="0"/>
-              <a:t>, </a:t>
-            </a:r>
-            <a:r>
-              <a:rPr lang="pt-PT" dirty="0" err="1"/>
-              <a:t>counter</a:t>
-            </a:r>
-            <a:r>
-              <a:rPr lang="pt-PT" dirty="0"/>
-              <a:t>, </a:t>
-            </a:r>
-            <a:r>
-              <a:rPr lang="pt-PT" dirty="0" err="1"/>
-              <a:t>answer</a:t>
-            </a:r>
-            <a:r>
-              <a:rPr lang="pt-PT" dirty="0"/>
-              <a:t>…)</a:t>
-            </a:r>
-          </a:p>
-          <a:p>
-            <a:endParaRPr lang="pt-PT" dirty="0"/>
-          </a:p>
-        </p:txBody>
-      </p:sp>
-      <p:sp>
-        <p:nvSpPr>
-          <p:cNvPr id="4" name="Marcador de Posição do Número do Diapositivo 3"/>
-          <p:cNvSpPr>
-            <a:spLocks noGrp="1"/>
-          </p:cNvSpPr>
-          <p:nvPr>
-            <p:ph type="sldNum" sz="quarter" idx="5"/>
-          </p:nvPr>
-        </p:nvSpPr>
-        <p:spPr/>
-        <p:txBody>
-          <a:bodyPr/>
-          <a:lstStyle/>
-          <a:p>
-            <a:fld id="{F9C76EEC-3DB8-4814-A8C5-185DA6C5A9E9}" type="slidenum">
-              <a:rPr lang="pt-PT" smtClean="0"/>
-              <a:t>8</a:t>
-            </a:fld>
-            <a:endParaRPr lang="pt-PT"/>
-          </a:p>
-        </p:txBody>
-      </p:sp>
-    </p:spTree>
-    <p:extLst>
-      <p:ext uri="{BB962C8B-B14F-4D97-AF65-F5344CB8AC3E}">
-        <p14:creationId xmlns:p14="http://schemas.microsoft.com/office/powerpoint/2010/main" val="2373765445"/>
-      </p:ext>
-    </p:extLst>
-  </p:cSld>
-  <p:clrMapOvr>
-    <a:masterClrMapping/>
-  </p:clrMapOvr>
-</p:notes>
-</file>
-
-<file path=ppt/notesSlides/notesSlide9.xml><?xml version="1.0" encoding="utf-8"?>
-<p:notes xmlns:a="http://schemas.openxmlformats.org/drawingml/2006/main" xmlns:r="http://schemas.openxmlformats.org/officeDocument/2006/relationships" xmlns:p="http://schemas.openxmlformats.org/presentationml/2006/main">
-  <p:cSld>
-    <p:spTree>
-      <p:nvGrpSpPr>
-        <p:cNvPr id="1" name=""/>
-        <p:cNvGrpSpPr/>
-        <p:nvPr/>
-      </p:nvGrpSpPr>
-      <p:grpSpPr>
-        <a:xfrm>
-          <a:off x="0" y="0"/>
-          <a:ext cx="0" cy="0"/>
-          <a:chOff x="0" y="0"/>
-          <a:chExt cx="0" cy="0"/>
-        </a:xfrm>
-      </p:grpSpPr>
-      <p:sp>
-        <p:nvSpPr>
-          <p:cNvPr id="2" name="Marcador de Posição da Imagem do Diapositivo 1"/>
-          <p:cNvSpPr>
-            <a:spLocks noGrp="1" noRot="1" noChangeAspect="1"/>
-          </p:cNvSpPr>
-          <p:nvPr>
-            <p:ph type="sldImg"/>
-          </p:nvPr>
-        </p:nvSpPr>
-        <p:spPr/>
-      </p:sp>
-      <p:sp>
-        <p:nvSpPr>
-          <p:cNvPr id="3" name="Marcador de Posição de Notas 2"/>
-          <p:cNvSpPr>
-            <a:spLocks noGrp="1"/>
-          </p:cNvSpPr>
-          <p:nvPr>
-            <p:ph type="body" idx="1"/>
-          </p:nvPr>
-        </p:nvSpPr>
-        <p:spPr/>
-        <p:txBody>
-          <a:bodyPr/>
-          <a:lstStyle/>
-          <a:p>
-            <a:r>
-              <a:rPr lang="pt-PT" dirty="0"/>
-              <a:t>GIL</a:t>
-            </a:r>
-          </a:p>
-          <a:p>
-            <a:endParaRPr lang="pt-PT" dirty="0"/>
-          </a:p>
-          <a:p>
-            <a:r>
-              <a:rPr lang="pt-PT" dirty="0"/>
-              <a:t>- No </a:t>
-            </a:r>
-            <a:r>
-              <a:rPr lang="pt-PT" dirty="0" err="1"/>
-              <a:t>python</a:t>
-            </a:r>
-            <a:r>
-              <a:rPr lang="pt-PT" dirty="0"/>
-              <a:t> falar do script para geração de frases, com cadeias de </a:t>
-            </a:r>
-            <a:r>
-              <a:rPr lang="pt-PT" dirty="0" err="1"/>
-              <a:t>Markov</a:t>
-            </a:r>
-            <a:r>
-              <a:rPr lang="pt-PT" dirty="0"/>
-              <a:t> e utilização de NLTK para processamento de frases (separar por palavras)</a:t>
-            </a:r>
-          </a:p>
-          <a:p>
-            <a:pPr marL="171450" indent="-171450">
-              <a:buFontTx/>
-              <a:buChar char="-"/>
-            </a:pPr>
-            <a:r>
-              <a:rPr lang="pt-PT" dirty="0" err="1"/>
-              <a:t>Sentence</a:t>
-            </a:r>
-            <a:r>
-              <a:rPr lang="pt-PT" dirty="0"/>
-              <a:t> </a:t>
-            </a:r>
-            <a:r>
-              <a:rPr lang="pt-PT" dirty="0" err="1"/>
-              <a:t>generator</a:t>
-            </a:r>
-            <a:r>
-              <a:rPr lang="pt-PT" dirty="0"/>
-              <a:t> </a:t>
-            </a:r>
-            <a:r>
-              <a:rPr lang="pt-PT" dirty="0" err="1"/>
-              <a:t>with</a:t>
-            </a:r>
-            <a:r>
-              <a:rPr lang="pt-PT" dirty="0"/>
-              <a:t> </a:t>
-            </a:r>
-            <a:r>
-              <a:rPr lang="pt-PT" dirty="0" err="1"/>
-              <a:t>Markov</a:t>
-            </a:r>
-            <a:r>
-              <a:rPr lang="pt-PT" dirty="0"/>
-              <a:t> </a:t>
-            </a:r>
-            <a:r>
-              <a:rPr lang="pt-PT" dirty="0" err="1"/>
-              <a:t>chains</a:t>
-            </a:r>
-            <a:r>
-              <a:rPr lang="pt-PT" dirty="0"/>
-              <a:t>: o programa </a:t>
-            </a:r>
-            <a:r>
-              <a:rPr lang="pt-PT" sz="1200" b="0" i="0" kern="1200" dirty="0">
-                <a:solidFill>
-                  <a:schemeClr val="tx1"/>
-                </a:solidFill>
-                <a:effectLst/>
-                <a:latin typeface="+mn-lt"/>
-                <a:ea typeface="+mn-ea"/>
-                <a:cs typeface="+mn-cs"/>
-              </a:rPr>
-              <a:t>cria um dicionário com as palavras, recebidas de um </a:t>
-            </a:r>
-            <a:r>
-              <a:rPr lang="pt-PT" sz="1200" b="0" i="0" kern="1200" dirty="0" err="1">
-                <a:solidFill>
-                  <a:schemeClr val="tx1"/>
-                </a:solidFill>
-                <a:effectLst/>
-                <a:latin typeface="+mn-lt"/>
-                <a:ea typeface="+mn-ea"/>
-                <a:cs typeface="+mn-cs"/>
-              </a:rPr>
-              <a:t>dataset</a:t>
-            </a:r>
-            <a:r>
-              <a:rPr lang="pt-PT" sz="1200" b="0" i="0" kern="1200" dirty="0">
-                <a:solidFill>
-                  <a:schemeClr val="tx1"/>
-                </a:solidFill>
-                <a:effectLst/>
-                <a:latin typeface="+mn-lt"/>
-                <a:ea typeface="+mn-ea"/>
-                <a:cs typeface="+mn-cs"/>
-              </a:rPr>
-              <a:t> com frases, e a palavra que vem a seguir, e depois aplica cadeias de </a:t>
-            </a:r>
-            <a:r>
-              <a:rPr lang="pt-PT" sz="1200" b="0" i="0" kern="1200" dirty="0" err="1">
-                <a:solidFill>
-                  <a:schemeClr val="tx1"/>
-                </a:solidFill>
-                <a:effectLst/>
-                <a:latin typeface="+mn-lt"/>
-                <a:ea typeface="+mn-ea"/>
-                <a:cs typeface="+mn-cs"/>
-              </a:rPr>
-              <a:t>Markov</a:t>
-            </a:r>
-            <a:r>
-              <a:rPr lang="pt-PT" sz="1200" b="0" i="0" kern="1200" dirty="0">
-                <a:solidFill>
-                  <a:schemeClr val="tx1"/>
-                </a:solidFill>
-                <a:effectLst/>
-                <a:latin typeface="+mn-lt"/>
-                <a:ea typeface="+mn-ea"/>
-                <a:cs typeface="+mn-cs"/>
-              </a:rPr>
-              <a:t> sobre essa informação tentando fazer frases que fazem sentido. As cadeias de </a:t>
-            </a:r>
-            <a:r>
-              <a:rPr lang="pt-PT" sz="1200" b="0" i="0" kern="1200" dirty="0" err="1">
-                <a:solidFill>
-                  <a:schemeClr val="tx1"/>
-                </a:solidFill>
-                <a:effectLst/>
-                <a:latin typeface="+mn-lt"/>
-                <a:ea typeface="+mn-ea"/>
-                <a:cs typeface="+mn-cs"/>
-              </a:rPr>
-              <a:t>Markov</a:t>
-            </a:r>
-            <a:r>
-              <a:rPr lang="pt-PT" sz="1200" b="0" i="0" kern="1200" dirty="0">
-                <a:solidFill>
-                  <a:schemeClr val="tx1"/>
-                </a:solidFill>
-                <a:effectLst/>
-                <a:latin typeface="+mn-lt"/>
-                <a:ea typeface="+mn-ea"/>
-                <a:cs typeface="+mn-cs"/>
-              </a:rPr>
-              <a:t> são uteis para prever o estado futuro com base nas características do estado presente. Assim , o programa utiliza e analisa as frases de um </a:t>
-            </a:r>
-            <a:r>
-              <a:rPr lang="pt-PT" sz="1200" b="0" i="0" kern="1200" dirty="0" err="1">
-                <a:solidFill>
-                  <a:schemeClr val="tx1"/>
-                </a:solidFill>
-                <a:effectLst/>
-                <a:latin typeface="+mn-lt"/>
-                <a:ea typeface="+mn-ea"/>
-                <a:cs typeface="+mn-cs"/>
-              </a:rPr>
-              <a:t>dataset</a:t>
-            </a:r>
-            <a:r>
-              <a:rPr lang="pt-PT" sz="1200" b="0" i="0" kern="1200" dirty="0">
-                <a:solidFill>
-                  <a:schemeClr val="tx1"/>
-                </a:solidFill>
-                <a:effectLst/>
-                <a:latin typeface="+mn-lt"/>
-                <a:ea typeface="+mn-ea"/>
-                <a:cs typeface="+mn-cs"/>
-              </a:rPr>
-              <a:t> inicial e, a partir dai, tenta prever e gerar novas frases. Utiliza as cadeiras de </a:t>
-            </a:r>
-            <a:r>
-              <a:rPr lang="pt-PT" sz="1200" b="0" i="0" kern="1200" dirty="0" err="1">
-                <a:solidFill>
-                  <a:schemeClr val="tx1"/>
-                </a:solidFill>
-                <a:effectLst/>
-                <a:latin typeface="+mn-lt"/>
-                <a:ea typeface="+mn-ea"/>
-                <a:cs typeface="+mn-cs"/>
-              </a:rPr>
-              <a:t>markov</a:t>
-            </a:r>
-            <a:r>
-              <a:rPr lang="pt-PT" sz="1200" b="0" i="0" kern="1200" dirty="0">
-                <a:solidFill>
-                  <a:schemeClr val="tx1"/>
-                </a:solidFill>
-                <a:effectLst/>
-                <a:latin typeface="+mn-lt"/>
-                <a:ea typeface="+mn-ea"/>
-                <a:cs typeface="+mn-cs"/>
-              </a:rPr>
-              <a:t> para prever quais as sequências de palavras mais adequadas que precedem a um outro conjunto de palavras.</a:t>
-            </a:r>
-          </a:p>
-          <a:p>
-            <a:pPr marL="171450" indent="-171450">
-              <a:buFontTx/>
-              <a:buChar char="-"/>
-            </a:pPr>
-            <a:r>
-              <a:rPr lang="pt-PT" sz="1200" b="0" i="0" kern="1200" dirty="0">
-                <a:solidFill>
-                  <a:schemeClr val="tx1"/>
-                </a:solidFill>
-                <a:effectLst/>
-                <a:latin typeface="+mn-lt"/>
-                <a:ea typeface="+mn-ea"/>
-                <a:cs typeface="+mn-cs"/>
-              </a:rPr>
-              <a:t>Cadeias de </a:t>
-            </a:r>
-            <a:r>
-              <a:rPr lang="pt-PT" sz="1200" b="0" i="0" kern="1200" dirty="0" err="1">
-                <a:solidFill>
-                  <a:schemeClr val="tx1"/>
-                </a:solidFill>
-                <a:effectLst/>
-                <a:latin typeface="+mn-lt"/>
-                <a:ea typeface="+mn-ea"/>
-                <a:cs typeface="+mn-cs"/>
-              </a:rPr>
-              <a:t>Markov</a:t>
-            </a:r>
-            <a:r>
-              <a:rPr lang="pt-PT" sz="1200" b="0" i="0" kern="1200" dirty="0">
-                <a:solidFill>
-                  <a:schemeClr val="tx1"/>
-                </a:solidFill>
-                <a:effectLst/>
-                <a:latin typeface="+mn-lt"/>
-                <a:ea typeface="+mn-ea"/>
-                <a:cs typeface="+mn-cs"/>
-              </a:rPr>
-              <a:t> são, por isso, bastante utilizadas neste tipo de situações!</a:t>
-            </a:r>
-            <a:endParaRPr lang="pt-PT" dirty="0"/>
-          </a:p>
-        </p:txBody>
-      </p:sp>
-      <p:sp>
-        <p:nvSpPr>
-          <p:cNvPr id="4" name="Marcador de Posição do Número do Diapositivo 3"/>
-          <p:cNvSpPr>
-            <a:spLocks noGrp="1"/>
-          </p:cNvSpPr>
-          <p:nvPr>
-            <p:ph type="sldNum" sz="quarter" idx="5"/>
-          </p:nvPr>
-        </p:nvSpPr>
-        <p:spPr/>
-        <p:txBody>
-          <a:bodyPr/>
-          <a:lstStyle/>
-          <a:p>
-            <a:fld id="{F9C76EEC-3DB8-4814-A8C5-185DA6C5A9E9}" type="slidenum">
-              <a:rPr lang="pt-PT" smtClean="0"/>
-              <a:t>9</a:t>
-            </a:fld>
-            <a:endParaRPr lang="pt-PT"/>
-          </a:p>
-        </p:txBody>
-      </p:sp>
-    </p:spTree>
-    <p:extLst>
-      <p:ext uri="{BB962C8B-B14F-4D97-AF65-F5344CB8AC3E}">
-        <p14:creationId xmlns:p14="http://schemas.microsoft.com/office/powerpoint/2010/main" val="3154484066"/>
+        <p14:creationId xmlns:p14="http://schemas.microsoft.com/office/powerpoint/2010/main" val="2587704403"/>
       </p:ext>
     </p:extLst>
   </p:cSld>
@@ -2451,7 +1138,7 @@
           <a:p>
             <a:fld id="{D3D2C362-FAA5-4C55-BE02-652F59C753E4}" type="datetimeFigureOut">
               <a:rPr lang="pt-PT" smtClean="0"/>
-              <a:t>27/03/2019</a:t>
+              <a:t>24/05/2019</a:t>
             </a:fld>
             <a:endParaRPr lang="pt-PT"/>
           </a:p>
@@ -2659,7 +1346,7 @@
           <a:p>
             <a:fld id="{D3D2C362-FAA5-4C55-BE02-652F59C753E4}" type="datetimeFigureOut">
               <a:rPr lang="pt-PT" smtClean="0"/>
-              <a:t>27/03/2019</a:t>
+              <a:t>24/05/2019</a:t>
             </a:fld>
             <a:endParaRPr lang="pt-PT"/>
           </a:p>
@@ -2915,7 +1602,7 @@
           <a:p>
             <a:fld id="{D3D2C362-FAA5-4C55-BE02-652F59C753E4}" type="datetimeFigureOut">
               <a:rPr lang="pt-PT" smtClean="0"/>
-              <a:t>27/03/2019</a:t>
+              <a:t>24/05/2019</a:t>
             </a:fld>
             <a:endParaRPr lang="pt-PT"/>
           </a:p>
@@ -3089,7 +1776,7 @@
           <a:p>
             <a:fld id="{D3D2C362-FAA5-4C55-BE02-652F59C753E4}" type="datetimeFigureOut">
               <a:rPr lang="pt-PT" smtClean="0"/>
-              <a:t>27/03/2019</a:t>
+              <a:t>24/05/2019</a:t>
             </a:fld>
             <a:endParaRPr lang="pt-PT"/>
           </a:p>
@@ -3432,7 +2119,7 @@
           <a:p>
             <a:fld id="{D3D2C362-FAA5-4C55-BE02-652F59C753E4}" type="datetimeFigureOut">
               <a:rPr lang="pt-PT" smtClean="0"/>
-              <a:t>27/03/2019</a:t>
+              <a:t>24/05/2019</a:t>
             </a:fld>
             <a:endParaRPr lang="pt-PT"/>
           </a:p>
@@ -3707,7 +2394,7 @@
           <a:p>
             <a:fld id="{D3D2C362-FAA5-4C55-BE02-652F59C753E4}" type="datetimeFigureOut">
               <a:rPr lang="pt-PT" smtClean="0"/>
-              <a:t>27/03/2019</a:t>
+              <a:t>24/05/2019</a:t>
             </a:fld>
             <a:endParaRPr lang="pt-PT"/>
           </a:p>
@@ -4086,7 +2773,7 @@
           <a:p>
             <a:fld id="{D3D2C362-FAA5-4C55-BE02-652F59C753E4}" type="datetimeFigureOut">
               <a:rPr lang="pt-PT" smtClean="0"/>
-              <a:t>27/03/2019</a:t>
+              <a:t>24/05/2019</a:t>
             </a:fld>
             <a:endParaRPr lang="pt-PT"/>
           </a:p>
@@ -4204,7 +2891,7 @@
           <a:p>
             <a:fld id="{D3D2C362-FAA5-4C55-BE02-652F59C753E4}" type="datetimeFigureOut">
               <a:rPr lang="pt-PT" smtClean="0"/>
-              <a:t>27/03/2019</a:t>
+              <a:t>24/05/2019</a:t>
             </a:fld>
             <a:endParaRPr lang="pt-PT"/>
           </a:p>
@@ -4375,7 +3062,7 @@
           <a:p>
             <a:fld id="{D3D2C362-FAA5-4C55-BE02-652F59C753E4}" type="datetimeFigureOut">
               <a:rPr lang="pt-PT" smtClean="0"/>
-              <a:t>27/03/2019</a:t>
+              <a:t>24/05/2019</a:t>
             </a:fld>
             <a:endParaRPr lang="pt-PT"/>
           </a:p>
@@ -4729,7 +3416,7 @@
           <a:p>
             <a:fld id="{D3D2C362-FAA5-4C55-BE02-652F59C753E4}" type="datetimeFigureOut">
               <a:rPr lang="pt-PT" smtClean="0"/>
-              <a:t>27/03/2019</a:t>
+              <a:t>24/05/2019</a:t>
             </a:fld>
             <a:endParaRPr lang="pt-PT"/>
           </a:p>
@@ -5111,7 +3798,7 @@
           <a:p>
             <a:fld id="{D3D2C362-FAA5-4C55-BE02-652F59C753E4}" type="datetimeFigureOut">
               <a:rPr lang="pt-PT" smtClean="0"/>
-              <a:t>27/03/2019</a:t>
+              <a:t>24/05/2019</a:t>
             </a:fld>
             <a:endParaRPr lang="pt-PT"/>
           </a:p>
@@ -5398,7 +4085,7 @@
           <a:p>
             <a:fld id="{D3D2C362-FAA5-4C55-BE02-652F59C753E4}" type="datetimeFigureOut">
               <a:rPr lang="pt-PT" smtClean="0"/>
-              <a:t>27/03/2019</a:t>
+              <a:t>24/05/2019</a:t>
             </a:fld>
             <a:endParaRPr lang="pt-PT"/>
           </a:p>
@@ -6224,7 +4911,7 @@
           <p:cNvPr id="2" name="Título 1">
             <a:extLst>
               <a:ext uri="{FF2B5EF4-FFF2-40B4-BE49-F238E27FC236}">
-                <a16:creationId xmlns:a16="http://schemas.microsoft.com/office/drawing/2014/main" id="{E7F3627F-344B-4BBB-AE8A-D976F33B76F1}"/>
+                <a16:creationId xmlns:a16="http://schemas.microsoft.com/office/drawing/2014/main" id="{D7D5C487-DAE2-4B7D-BFE9-AF4871322A8E}"/>
               </a:ext>
             </a:extLst>
           </p:cNvPr>
@@ -6241,24 +4928,18 @@
           <a:lstStyle/>
           <a:p>
             <a:r>
-              <a:rPr lang="pt-PT" dirty="0">
-                <a:solidFill>
-                  <a:schemeClr val="bg1">
-                    <a:lumMod val="50000"/>
-                  </a:schemeClr>
-                </a:solidFill>
-              </a:rPr>
-              <a:t>Conclusões</a:t>
-            </a:r>
-          </a:p>
-        </p:txBody>
-      </p:sp>
-      <p:sp>
-        <p:nvSpPr>
-          <p:cNvPr id="3" name="Marcador de Posição de Conteúdo 2">
+              <a:rPr lang="pt-PT" dirty="0"/>
+              <a:t>Funcionamento do Sistema</a:t>
+            </a:r>
+          </a:p>
+        </p:txBody>
+      </p:sp>
+      <p:sp>
+        <p:nvSpPr>
+          <p:cNvPr id="4" name="Marcador de Posição do Texto 3">
             <a:extLst>
               <a:ext uri="{FF2B5EF4-FFF2-40B4-BE49-F238E27FC236}">
-                <a16:creationId xmlns:a16="http://schemas.microsoft.com/office/drawing/2014/main" id="{8FF2DE50-49B0-47EC-8D7A-0F77D0C69A13}"/>
+                <a16:creationId xmlns:a16="http://schemas.microsoft.com/office/drawing/2014/main" id="{417E3BDF-5D19-4BAF-AEB7-734DBFCE7AA0}"/>
               </a:ext>
             </a:extLst>
           </p:cNvPr>
@@ -6266,13 +4947,13 @@
             <a:spLocks noGrp="1"/>
           </p:cNvSpPr>
           <p:nvPr>
-            <p:ph idx="1"/>
-          </p:nvPr>
-        </p:nvSpPr>
-        <p:spPr>
-          <a:xfrm>
-            <a:off x="1171422" y="1964266"/>
-            <a:ext cx="10058400" cy="4023360"/>
+            <p:ph type="body" sz="half" idx="2"/>
+          </p:nvPr>
+        </p:nvSpPr>
+        <p:spPr>
+          <a:xfrm>
+            <a:off x="457200" y="2858701"/>
+            <a:ext cx="3441032" cy="3746925"/>
           </a:xfrm>
         </p:spPr>
         <p:txBody>
@@ -6282,95 +4963,198 @@
           <a:lstStyle/>
           <a:p>
             <a:pPr>
-              <a:buFont typeface="Wingdings" panose="05000000000000000000" pitchFamily="2" charset="2"/>
-              <a:buChar char="q"/>
+              <a:lnSpc>
+                <a:spcPct val="120000"/>
+              </a:lnSpc>
             </a:pPr>
-            <a:r>
-              <a:rPr lang="pt-PT" dirty="0"/>
-              <a:t> Tema interessante e fora da área de trabalho comum do grupo.</a:t>
-            </a:r>
-          </a:p>
-          <a:p>
-            <a:pPr>
-              <a:buFont typeface="Wingdings" panose="05000000000000000000" pitchFamily="2" charset="2"/>
-              <a:buChar char="q"/>
-            </a:pPr>
-            <a:r>
-              <a:rPr lang="pt-PT" dirty="0"/>
-              <a:t> Nesta fase:</a:t>
-            </a:r>
-          </a:p>
-          <a:p>
-            <a:pPr lvl="1">
-              <a:buFont typeface="Wingdings" panose="05000000000000000000" pitchFamily="2" charset="2"/>
-              <a:buChar char="q"/>
-            </a:pPr>
-            <a:r>
-              <a:rPr lang="pt-PT" dirty="0"/>
-              <a:t> Constituição da base de conhecimento para as falas do diálogo (em constante alteração);</a:t>
-            </a:r>
-          </a:p>
-          <a:p>
-            <a:pPr lvl="1">
-              <a:buFont typeface="Wingdings" panose="05000000000000000000" pitchFamily="2" charset="2"/>
-              <a:buChar char="q"/>
-            </a:pPr>
-            <a:r>
-              <a:rPr lang="pt-PT" dirty="0"/>
-              <a:t> Geração autónoma de frases;</a:t>
-            </a:r>
-          </a:p>
-          <a:p>
-            <a:pPr lvl="1">
-              <a:buFont typeface="Wingdings" panose="05000000000000000000" pitchFamily="2" charset="2"/>
-              <a:buChar char="q"/>
-            </a:pPr>
-            <a:r>
-              <a:rPr lang="pt-PT" dirty="0"/>
-              <a:t> Configuração do padrão (em constante alteração);</a:t>
-            </a:r>
-          </a:p>
-          <a:p>
-            <a:pPr lvl="1">
-              <a:buFont typeface="Wingdings" panose="05000000000000000000" pitchFamily="2" charset="2"/>
-              <a:buChar char="q"/>
-            </a:pPr>
-            <a:r>
-              <a:rPr lang="pt-PT" dirty="0"/>
-              <a:t> Desenvolvimento do analisador do padrão;</a:t>
-            </a:r>
-          </a:p>
-          <a:p>
-            <a:pPr lvl="1">
-              <a:buFont typeface="Wingdings" panose="05000000000000000000" pitchFamily="2" charset="2"/>
-              <a:buChar char="q"/>
-            </a:pPr>
-            <a:r>
-              <a:rPr lang="pt-PT" dirty="0"/>
-              <a:t> Desenvolvimento do motor de regras.</a:t>
-            </a:r>
-          </a:p>
-          <a:p>
-            <a:pPr marL="201168" lvl="1" indent="0">
-              <a:buNone/>
-            </a:pPr>
+            <a:endParaRPr lang="sv-SE" sz="5200" dirty="0"/>
+          </a:p>
+        </p:txBody>
+      </p:sp>
+      <p:sp>
+        <p:nvSpPr>
+          <p:cNvPr id="20" name="Marcador de Posição de Conteúdo 19">
+            <a:extLst>
+              <a:ext uri="{FF2B5EF4-FFF2-40B4-BE49-F238E27FC236}">
+                <a16:creationId xmlns:a16="http://schemas.microsoft.com/office/drawing/2014/main" id="{E6D76E72-3E5E-4298-ADA6-0607B4B80320}"/>
+              </a:ext>
+            </a:extLst>
+          </p:cNvPr>
+          <p:cNvSpPr>
+            <a:spLocks noGrp="1"/>
+          </p:cNvSpPr>
+          <p:nvPr>
+            <p:ph idx="1"/>
+          </p:nvPr>
+        </p:nvSpPr>
+        <p:spPr>
+          <a:xfrm>
+            <a:off x="4800600" y="1911352"/>
+            <a:ext cx="6492240" cy="4077967"/>
+          </a:xfrm>
+        </p:spPr>
+        <p:txBody>
+          <a:bodyPr/>
+          <a:lstStyle/>
+          <a:p>
             <a:endParaRPr lang="pt-PT" dirty="0"/>
           </a:p>
         </p:txBody>
       </p:sp>
+      <p:pic>
+        <p:nvPicPr>
+          <p:cNvPr id="22" name="Marcador de Posição de Conteúdo 9" descr="Uma imagem com captura de ecrã&#10;&#10;Descrição gerada automaticamente">
+            <a:extLst>
+              <a:ext uri="{FF2B5EF4-FFF2-40B4-BE49-F238E27FC236}">
+                <a16:creationId xmlns:a16="http://schemas.microsoft.com/office/drawing/2014/main" id="{50375737-C7DA-43B7-A2F5-C20ED74572B3}"/>
+              </a:ext>
+            </a:extLst>
+          </p:cNvPr>
+          <p:cNvPicPr>
+            <a:picLocks noChangeAspect="1"/>
+          </p:cNvPicPr>
+          <p:nvPr/>
+        </p:nvPicPr>
+        <p:blipFill>
+          <a:blip r:embed="rId2">
+            <a:extLst>
+              <a:ext uri="{28A0092B-C50C-407E-A947-70E740481C1C}">
+                <a14:useLocalDpi xmlns:a14="http://schemas.microsoft.com/office/drawing/2010/main" val="0"/>
+              </a:ext>
+            </a:extLst>
+          </a:blip>
+          <a:stretch>
+            <a:fillRect/>
+          </a:stretch>
+        </p:blipFill>
+        <p:spPr>
+          <a:xfrm>
+            <a:off x="4696327" y="252372"/>
+            <a:ext cx="6625388" cy="6353255"/>
+          </a:xfrm>
+          <a:prstGeom prst="rect">
+            <a:avLst/>
+          </a:prstGeom>
+        </p:spPr>
+      </p:pic>
+      <p:sp>
+        <p:nvSpPr>
+          <p:cNvPr id="9" name="Retângulo 8">
+            <a:extLst>
+              <a:ext uri="{FF2B5EF4-FFF2-40B4-BE49-F238E27FC236}">
+                <a16:creationId xmlns:a16="http://schemas.microsoft.com/office/drawing/2014/main" id="{0328868E-BE98-426E-ACAC-2E1D7B160452}"/>
+              </a:ext>
+            </a:extLst>
+          </p:cNvPr>
+          <p:cNvSpPr/>
+          <p:nvPr/>
+        </p:nvSpPr>
+        <p:spPr>
+          <a:xfrm>
+            <a:off x="7915450" y="914400"/>
+            <a:ext cx="218783" cy="157075"/>
+          </a:xfrm>
+          <a:prstGeom prst="rect">
+            <a:avLst/>
+          </a:prstGeom>
+          <a:solidFill>
+            <a:schemeClr val="bg1"/>
+          </a:solidFill>
+          <a:ln>
+            <a:solidFill>
+              <a:schemeClr val="bg1"/>
+            </a:solidFill>
+          </a:ln>
+        </p:spPr>
+        <p:style>
+          <a:lnRef idx="2">
+            <a:schemeClr val="accent1">
+              <a:shade val="50000"/>
+            </a:schemeClr>
+          </a:lnRef>
+          <a:fillRef idx="1">
+            <a:schemeClr val="accent1"/>
+          </a:fillRef>
+          <a:effectRef idx="0">
+            <a:schemeClr val="accent1"/>
+          </a:effectRef>
+          <a:fontRef idx="minor">
+            <a:schemeClr val="lt1"/>
+          </a:fontRef>
+        </p:style>
+        <p:txBody>
+          <a:bodyPr rtlCol="0" anchor="ctr"/>
+          <a:lstStyle/>
+          <a:p>
+            <a:pPr algn="ctr"/>
+            <a:endParaRPr lang="pt-PT"/>
+          </a:p>
+        </p:txBody>
+      </p:sp>
+      <p:cxnSp>
+        <p:nvCxnSpPr>
+          <p:cNvPr id="8" name="Conexão: Ângulo Reto 7">
+            <a:extLst>
+              <a:ext uri="{FF2B5EF4-FFF2-40B4-BE49-F238E27FC236}">
+                <a16:creationId xmlns:a16="http://schemas.microsoft.com/office/drawing/2014/main" id="{C02C7A4A-4398-43CF-9D60-0174ED2493C3}"/>
+              </a:ext>
+            </a:extLst>
+          </p:cNvPr>
+          <p:cNvCxnSpPr>
+            <a:cxnSpLocks/>
+          </p:cNvCxnSpPr>
+          <p:nvPr/>
+        </p:nvCxnSpPr>
+        <p:spPr>
+          <a:xfrm rot="5400000" flipH="1" flipV="1">
+            <a:off x="7207496" y="1105415"/>
+            <a:ext cx="1042670" cy="569205"/>
+          </a:xfrm>
+          <a:prstGeom prst="bentConnector3">
+            <a:avLst>
+              <a:gd name="adj1" fmla="val 33321"/>
+            </a:avLst>
+          </a:prstGeom>
+          <a:ln w="28575">
+            <a:solidFill>
+              <a:srgbClr val="FF3300"/>
+            </a:solidFill>
+            <a:tailEnd type="triangle"/>
+          </a:ln>
+          <a:effectLst>
+            <a:glow rad="63500">
+              <a:schemeClr val="accent2">
+                <a:satMod val="175000"/>
+                <a:alpha val="40000"/>
+              </a:schemeClr>
+            </a:glow>
+          </a:effectLst>
+        </p:spPr>
+        <p:style>
+          <a:lnRef idx="1">
+            <a:schemeClr val="accent1"/>
+          </a:lnRef>
+          <a:fillRef idx="0">
+            <a:schemeClr val="accent1"/>
+          </a:fillRef>
+          <a:effectRef idx="0">
+            <a:schemeClr val="accent1"/>
+          </a:effectRef>
+          <a:fontRef idx="minor">
+            <a:schemeClr val="tx1"/>
+          </a:fontRef>
+        </p:style>
+      </p:cxnSp>
     </p:spTree>
     <p:extLst>
       <p:ext uri="{BB962C8B-B14F-4D97-AF65-F5344CB8AC3E}">
-        <p14:creationId xmlns:p14="http://schemas.microsoft.com/office/powerpoint/2010/main" val="2408894607"/>
+        <p14:creationId xmlns:p14="http://schemas.microsoft.com/office/powerpoint/2010/main" val="907343855"/>
       </p:ext>
     </p:extLst>
   </p:cSld>
   <p:clrMapOvr>
     <a:masterClrMapping/>
   </p:clrMapOvr>
-  <p:transition spd="slow">
-    <p:cover/>
-  </p:transition>
 </p:sld>
 </file>
 
@@ -6396,7 +5180,7 @@
           <p:cNvPr id="2" name="Título 1">
             <a:extLst>
               <a:ext uri="{FF2B5EF4-FFF2-40B4-BE49-F238E27FC236}">
-                <a16:creationId xmlns:a16="http://schemas.microsoft.com/office/drawing/2014/main" id="{E7F3627F-344B-4BBB-AE8A-D976F33B76F1}"/>
+                <a16:creationId xmlns:a16="http://schemas.microsoft.com/office/drawing/2014/main" id="{D7D5C487-DAE2-4B7D-BFE9-AF4871322A8E}"/>
               </a:ext>
             </a:extLst>
           </p:cNvPr>
@@ -6413,24 +5197,18 @@
           <a:lstStyle/>
           <a:p>
             <a:r>
-              <a:rPr lang="pt-PT" dirty="0">
-                <a:solidFill>
-                  <a:schemeClr val="bg1">
-                    <a:lumMod val="50000"/>
-                  </a:schemeClr>
-                </a:solidFill>
-              </a:rPr>
-              <a:t>Trabalho Futuro</a:t>
-            </a:r>
-          </a:p>
-        </p:txBody>
-      </p:sp>
-      <p:sp>
-        <p:nvSpPr>
-          <p:cNvPr id="3" name="Marcador de Posição de Conteúdo 2">
+              <a:rPr lang="pt-PT" dirty="0"/>
+              <a:t>Funcionamento do Sistema</a:t>
+            </a:r>
+          </a:p>
+        </p:txBody>
+      </p:sp>
+      <p:sp>
+        <p:nvSpPr>
+          <p:cNvPr id="4" name="Marcador de Posição do Texto 3">
             <a:extLst>
               <a:ext uri="{FF2B5EF4-FFF2-40B4-BE49-F238E27FC236}">
-                <a16:creationId xmlns:a16="http://schemas.microsoft.com/office/drawing/2014/main" id="{8FF2DE50-49B0-47EC-8D7A-0F77D0C69A13}"/>
+                <a16:creationId xmlns:a16="http://schemas.microsoft.com/office/drawing/2014/main" id="{417E3BDF-5D19-4BAF-AEB7-734DBFCE7AA0}"/>
               </a:ext>
             </a:extLst>
           </p:cNvPr>
@@ -6438,13 +5216,13 @@
             <a:spLocks noGrp="1"/>
           </p:cNvSpPr>
           <p:nvPr>
-            <p:ph idx="1"/>
-          </p:nvPr>
-        </p:nvSpPr>
-        <p:spPr>
-          <a:xfrm>
-            <a:off x="1208493" y="1964266"/>
-            <a:ext cx="10058400" cy="4023360"/>
+            <p:ph type="body" sz="half" idx="2"/>
+          </p:nvPr>
+        </p:nvSpPr>
+        <p:spPr>
+          <a:xfrm>
+            <a:off x="457200" y="2858701"/>
+            <a:ext cx="3441032" cy="3746925"/>
           </a:xfrm>
         </p:spPr>
         <p:txBody>
@@ -6453,50 +5231,89 @@
           </a:bodyPr>
           <a:lstStyle/>
           <a:p>
-            <a:pPr>
-              <a:buFont typeface="Wingdings" panose="05000000000000000000" pitchFamily="2" charset="2"/>
-              <a:buChar char="q"/>
-            </a:pPr>
-            <a:r>
-              <a:rPr lang="pt-PT" dirty="0"/>
-              <a:t> Esboço da árvore de decisão.</a:t>
-            </a:r>
-          </a:p>
-          <a:p>
-            <a:pPr>
-              <a:buFont typeface="Wingdings" panose="05000000000000000000" pitchFamily="2" charset="2"/>
-              <a:buChar char="q"/>
-            </a:pPr>
-            <a:r>
-              <a:rPr lang="pt-PT" dirty="0"/>
-              <a:t> Adição e aprimoramento de regras ao motor.</a:t>
-            </a:r>
-          </a:p>
-          <a:p>
-            <a:pPr>
-              <a:buFont typeface="Wingdings" panose="05000000000000000000" pitchFamily="2" charset="2"/>
-              <a:buChar char="q"/>
-            </a:pPr>
-            <a:r>
-              <a:rPr lang="pt-PT" dirty="0"/>
-              <a:t> Continuação do desenvolvimento do sistema atual.</a:t>
-            </a:r>
-          </a:p>
-        </p:txBody>
-      </p:sp>
+            <a:r>
+              <a:rPr lang="pt-PT" sz="1600" dirty="0"/>
+              <a:t>Leonardo: Então, foste de férias? Vamos lá praticar!😀</a:t>
+            </a:r>
+          </a:p>
+        </p:txBody>
+      </p:sp>
+      <p:sp>
+        <p:nvSpPr>
+          <p:cNvPr id="20" name="Marcador de Posição de Conteúdo 19">
+            <a:extLst>
+              <a:ext uri="{FF2B5EF4-FFF2-40B4-BE49-F238E27FC236}">
+                <a16:creationId xmlns:a16="http://schemas.microsoft.com/office/drawing/2014/main" id="{E6D76E72-3E5E-4298-ADA6-0607B4B80320}"/>
+              </a:ext>
+            </a:extLst>
+          </p:cNvPr>
+          <p:cNvSpPr>
+            <a:spLocks noGrp="1"/>
+          </p:cNvSpPr>
+          <p:nvPr>
+            <p:ph idx="1"/>
+          </p:nvPr>
+        </p:nvSpPr>
+        <p:spPr>
+          <a:xfrm>
+            <a:off x="4800600" y="1911352"/>
+            <a:ext cx="6492240" cy="4077967"/>
+          </a:xfrm>
+        </p:spPr>
+        <p:txBody>
+          <a:bodyPr/>
+          <a:lstStyle/>
+          <a:p>
+            <a:endParaRPr lang="pt-PT" dirty="0"/>
+          </a:p>
+        </p:txBody>
+      </p:sp>
+      <p:pic>
+        <p:nvPicPr>
+          <p:cNvPr id="22" name="Marcador de Posição de Conteúdo 9" descr="Uma imagem com captura de ecrã&#10;&#10;Descrição gerada automaticamente">
+            <a:extLst>
+              <a:ext uri="{FF2B5EF4-FFF2-40B4-BE49-F238E27FC236}">
+                <a16:creationId xmlns:a16="http://schemas.microsoft.com/office/drawing/2014/main" id="{50375737-C7DA-43B7-A2F5-C20ED74572B3}"/>
+              </a:ext>
+            </a:extLst>
+          </p:cNvPr>
+          <p:cNvPicPr>
+            <a:picLocks noChangeAspect="1"/>
+          </p:cNvPicPr>
+          <p:nvPr/>
+        </p:nvPicPr>
+        <p:blipFill>
+          <a:blip r:embed="rId3">
+            <a:extLst>
+              <a:ext uri="{28A0092B-C50C-407E-A947-70E740481C1C}">
+                <a14:useLocalDpi xmlns:a14="http://schemas.microsoft.com/office/drawing/2010/main" val="0"/>
+              </a:ext>
+            </a:extLst>
+          </a:blip>
+          <a:stretch>
+            <a:fillRect/>
+          </a:stretch>
+        </p:blipFill>
+        <p:spPr>
+          <a:xfrm>
+            <a:off x="4696327" y="252372"/>
+            <a:ext cx="6625388" cy="6353255"/>
+          </a:xfrm>
+          <a:prstGeom prst="rect">
+            <a:avLst/>
+          </a:prstGeom>
+        </p:spPr>
+      </p:pic>
     </p:spTree>
     <p:extLst>
       <p:ext uri="{BB962C8B-B14F-4D97-AF65-F5344CB8AC3E}">
-        <p14:creationId xmlns:p14="http://schemas.microsoft.com/office/powerpoint/2010/main" val="2191826000"/>
+        <p14:creationId xmlns:p14="http://schemas.microsoft.com/office/powerpoint/2010/main" val="4128250842"/>
       </p:ext>
     </p:extLst>
   </p:cSld>
   <p:clrMapOvr>
     <a:masterClrMapping/>
   </p:clrMapOvr>
-  <p:transition spd="slow">
-    <p:cover/>
-  </p:transition>
 </p:sld>
 </file>
 
@@ -6880,7 +5697,7 @@
             </a:pPr>
             <a:r>
               <a:rPr lang="pt-PT" dirty="0"/>
-              <a:t> Contextualização</a:t>
+              <a:t> Introdução</a:t>
             </a:r>
           </a:p>
           <a:p>
@@ -6890,7 +5707,7 @@
             </a:pPr>
             <a:r>
               <a:rPr lang="pt-PT" dirty="0"/>
-              <a:t> Motivação</a:t>
+              <a:t> Trabalho Relacionado</a:t>
             </a:r>
           </a:p>
           <a:p>
@@ -6900,7 +5717,7 @@
             </a:pPr>
             <a:r>
               <a:rPr lang="pt-PT" dirty="0"/>
-              <a:t> Objetivos</a:t>
+              <a:t> Conceção e Implementação do Sistema</a:t>
             </a:r>
           </a:p>
           <a:p>
@@ -6910,7 +5727,7 @@
             </a:pPr>
             <a:r>
               <a:rPr lang="pt-PT" dirty="0"/>
-              <a:t> Apresentação do Componente</a:t>
+              <a:t> Recursos Computacionais</a:t>
             </a:r>
           </a:p>
           <a:p>
@@ -6920,7 +5737,17 @@
             </a:pPr>
             <a:r>
               <a:rPr lang="pt-PT" dirty="0"/>
-              <a:t> Ferramentas utilizadas</a:t>
+              <a:t> Instalação e Configuração</a:t>
+            </a:r>
+          </a:p>
+          <a:p>
+            <a:pPr>
+              <a:buFont typeface="Wingdings" panose="05000000000000000000" pitchFamily="2" charset="2"/>
+              <a:buChar char="q"/>
+            </a:pPr>
+            <a:r>
+              <a:rPr lang="pt-PT" dirty="0"/>
+              <a:t> Funcionamento do Sistema</a:t>
             </a:r>
           </a:p>
           <a:p>
@@ -6973,7 +5800,7 @@
           <p:cNvPr id="2" name="Título 1">
             <a:extLst>
               <a:ext uri="{FF2B5EF4-FFF2-40B4-BE49-F238E27FC236}">
-                <a16:creationId xmlns:a16="http://schemas.microsoft.com/office/drawing/2014/main" id="{9DA54CA6-DF71-42B3-BA6C-A5070B9A6FCF}"/>
+                <a16:creationId xmlns:a16="http://schemas.microsoft.com/office/drawing/2014/main" id="{E7F3627F-344B-4BBB-AE8A-D976F33B76F1}"/>
               </a:ext>
             </a:extLst>
           </p:cNvPr>
@@ -6997,7 +5824,7 @@
                   </a:schemeClr>
                 </a:solidFill>
               </a:rPr>
-              <a:t>Contextualização</a:t>
+              <a:t>Instalação e Configuração</a:t>
             </a:r>
           </a:p>
         </p:txBody>
@@ -7007,7 +5834,7 @@
           <p:cNvPr id="3" name="Marcador de Posição de Conteúdo 2">
             <a:extLst>
               <a:ext uri="{FF2B5EF4-FFF2-40B4-BE49-F238E27FC236}">
-                <a16:creationId xmlns:a16="http://schemas.microsoft.com/office/drawing/2014/main" id="{9AC072B4-F76D-46EF-9BF9-52FD93046E58}"/>
+                <a16:creationId xmlns:a16="http://schemas.microsoft.com/office/drawing/2014/main" id="{8FF2DE50-49B0-47EC-8D7A-0F77D0C69A13}"/>
               </a:ext>
             </a:extLst>
           </p:cNvPr>
@@ -7020,12 +5847,14 @@
         </p:nvSpPr>
         <p:spPr>
           <a:xfrm>
-            <a:off x="1097280" y="1930401"/>
+            <a:off x="1208493" y="1964266"/>
             <a:ext cx="10058400" cy="4023360"/>
           </a:xfrm>
         </p:spPr>
         <p:txBody>
-          <a:bodyPr/>
+          <a:bodyPr>
+            <a:normAutofit/>
+          </a:bodyPr>
           <a:lstStyle/>
           <a:p>
             <a:pPr>
@@ -7034,65 +5863,7 @@
             </a:pPr>
             <a:r>
               <a:rPr lang="pt-PT" dirty="0"/>
-              <a:t> Projeto “Leonardo” surge como um sistema de avaliação de determinadas </a:t>
-            </a:r>
-            <a:r>
-              <a:rPr lang="pt-PT" dirty="0" err="1"/>
-              <a:t>UCs</a:t>
-            </a:r>
-            <a:r>
-              <a:rPr lang="pt-PT" dirty="0"/>
-              <a:t>:</a:t>
-            </a:r>
-          </a:p>
-          <a:p>
-            <a:pPr lvl="1">
-              <a:buFont typeface="Wingdings" panose="05000000000000000000" pitchFamily="2" charset="2"/>
-              <a:buChar char="q"/>
-            </a:pPr>
-            <a:r>
-              <a:rPr lang="pt-PT" dirty="0"/>
-              <a:t> Bases de Dados</a:t>
-            </a:r>
-          </a:p>
-          <a:p>
-            <a:pPr lvl="2">
-              <a:buFont typeface="Wingdings" panose="05000000000000000000" pitchFamily="2" charset="2"/>
-              <a:buChar char="q"/>
-            </a:pPr>
-            <a:r>
-              <a:rPr lang="pt-PT" dirty="0"/>
-              <a:t> Álgebra Relacional</a:t>
-            </a:r>
-          </a:p>
-          <a:p>
-            <a:pPr lvl="2">
-              <a:buFont typeface="Wingdings" panose="05000000000000000000" pitchFamily="2" charset="2"/>
-              <a:buChar char="q"/>
-            </a:pPr>
-            <a:r>
-              <a:rPr lang="pt-PT" dirty="0"/>
-              <a:t> Modelo Conceptual </a:t>
-            </a:r>
-          </a:p>
-          <a:p>
-            <a:pPr lvl="2">
-              <a:buFont typeface="Wingdings" panose="05000000000000000000" pitchFamily="2" charset="2"/>
-              <a:buChar char="q"/>
-            </a:pPr>
-            <a:r>
-              <a:rPr lang="pt-PT" dirty="0"/>
-              <a:t> Modelo Lógico</a:t>
-            </a:r>
-          </a:p>
-          <a:p>
-            <a:pPr lvl="2">
-              <a:buFont typeface="Wingdings" panose="05000000000000000000" pitchFamily="2" charset="2"/>
-              <a:buChar char="q"/>
-            </a:pPr>
-            <a:r>
-              <a:rPr lang="pt-PT" dirty="0"/>
-              <a:t>…</a:t>
+              <a:t> Esboço da árvore de decisão.</a:t>
             </a:r>
           </a:p>
           <a:p>
@@ -7102,35 +5873,7 @@
             </a:pPr>
             <a:r>
               <a:rPr lang="pt-PT" dirty="0"/>
-              <a:t> Cada aluno tem um perfil</a:t>
-            </a:r>
-            <a:r>
-              <a:rPr lang="pt-PT" i="1" dirty="0"/>
-              <a:t>: </a:t>
-            </a:r>
-          </a:p>
-          <a:p>
-            <a:pPr lvl="1">
-              <a:buFont typeface="Wingdings" panose="05000000000000000000" pitchFamily="2" charset="2"/>
-              <a:buChar char="q"/>
-            </a:pPr>
-            <a:r>
-              <a:rPr lang="pt-PT" i="1" dirty="0"/>
-              <a:t> </a:t>
-            </a:r>
-            <a:r>
-              <a:rPr lang="pt-PT" dirty="0"/>
-              <a:t>Diferentes desempenhos e destrezas em vários temas avaliados;</a:t>
-            </a:r>
-          </a:p>
-          <a:p>
-            <a:pPr lvl="1">
-              <a:buFont typeface="Wingdings" panose="05000000000000000000" pitchFamily="2" charset="2"/>
-              <a:buChar char="q"/>
-            </a:pPr>
-            <a:r>
-              <a:rPr lang="pt-PT" dirty="0"/>
-              <a:t> “Personalidade” e “Sensibilidade”;</a:t>
+              <a:t> Adição e aprimoramento de regras ao motor.</a:t>
             </a:r>
           </a:p>
           <a:p>
@@ -7140,21 +5883,15 @@
             </a:pPr>
             <a:r>
               <a:rPr lang="pt-PT" dirty="0"/>
-              <a:t> Desenvolvimento de um gestor de diálogos como personificação do Leonardo.</a:t>
-            </a:r>
-          </a:p>
-          <a:p>
-            <a:endParaRPr lang="pt-PT" dirty="0"/>
-          </a:p>
-          <a:p>
-            <a:endParaRPr lang="pt-PT" dirty="0"/>
+              <a:t> Continuação do desenvolvimento do sistema atual.</a:t>
+            </a:r>
           </a:p>
         </p:txBody>
       </p:sp>
     </p:spTree>
     <p:extLst>
       <p:ext uri="{BB962C8B-B14F-4D97-AF65-F5344CB8AC3E}">
-        <p14:creationId xmlns:p14="http://schemas.microsoft.com/office/powerpoint/2010/main" val="3413792368"/>
+        <p14:creationId xmlns:p14="http://schemas.microsoft.com/office/powerpoint/2010/main" val="2191826000"/>
       </p:ext>
     </p:extLst>
   </p:cSld>
@@ -7189,7 +5926,7 @@
           <p:cNvPr id="2" name="Título 1">
             <a:extLst>
               <a:ext uri="{FF2B5EF4-FFF2-40B4-BE49-F238E27FC236}">
-                <a16:creationId xmlns:a16="http://schemas.microsoft.com/office/drawing/2014/main" id="{6C9FBC37-A4DC-42B0-93BE-431C67A2D247}"/>
+                <a16:creationId xmlns:a16="http://schemas.microsoft.com/office/drawing/2014/main" id="{40D71B53-1F1F-4403-B5FE-3674B7071BDC}"/>
               </a:ext>
             </a:extLst>
           </p:cNvPr>
@@ -7206,79 +5943,127 @@
           <a:lstStyle/>
           <a:p>
             <a:r>
-              <a:rPr lang="pt-PT" dirty="0">
-                <a:solidFill>
-                  <a:schemeClr val="bg1">
-                    <a:lumMod val="50000"/>
-                  </a:schemeClr>
-                </a:solidFill>
-              </a:rPr>
-              <a:t>Motivação</a:t>
-            </a:r>
-          </a:p>
-        </p:txBody>
-      </p:sp>
-      <p:sp>
-        <p:nvSpPr>
-          <p:cNvPr id="3" name="Marcador de Posição de Conteúdo 2">
+              <a:rPr lang="pt-PT" dirty="0"/>
+              <a:t>Funcionamento do Sistema</a:t>
+            </a:r>
+          </a:p>
+        </p:txBody>
+      </p:sp>
+      <p:pic>
+        <p:nvPicPr>
+          <p:cNvPr id="6" name="Marcador de Posição de Conteúdo 5">
             <a:extLst>
               <a:ext uri="{FF2B5EF4-FFF2-40B4-BE49-F238E27FC236}">
-                <a16:creationId xmlns:a16="http://schemas.microsoft.com/office/drawing/2014/main" id="{5EE258BC-B64A-4F62-8241-57130EEF2895}"/>
+                <a16:creationId xmlns:a16="http://schemas.microsoft.com/office/drawing/2014/main" id="{3BBD17AD-75BF-44D0-AB26-1F4E27D0F5A9}"/>
               </a:ext>
             </a:extLst>
           </p:cNvPr>
-          <p:cNvSpPr>
-            <a:spLocks noGrp="1"/>
-          </p:cNvSpPr>
+          <p:cNvPicPr>
+            <a:picLocks noGrp="1" noChangeAspect="1"/>
+          </p:cNvPicPr>
           <p:nvPr>
             <p:ph idx="1"/>
           </p:nvPr>
-        </p:nvSpPr>
-        <p:spPr>
-          <a:xfrm>
-            <a:off x="1097280" y="1930401"/>
-            <a:ext cx="10058400" cy="4023360"/>
-          </a:xfrm>
-        </p:spPr>
+        </p:nvPicPr>
+        <p:blipFill>
+          <a:blip r:embed="rId2">
+            <a:extLst>
+              <a:ext uri="{28A0092B-C50C-407E-A947-70E740481C1C}">
+                <a14:useLocalDpi xmlns:a14="http://schemas.microsoft.com/office/drawing/2010/main" val="0"/>
+              </a:ext>
+            </a:extLst>
+          </a:blip>
+          <a:stretch>
+            <a:fillRect/>
+          </a:stretch>
+        </p:blipFill>
+        <p:spPr>
+          <a:xfrm>
+            <a:off x="5227320" y="243602"/>
+            <a:ext cx="5547360" cy="6370796"/>
+          </a:xfrm>
+        </p:spPr>
+      </p:pic>
+      <p:sp>
+        <p:nvSpPr>
+          <p:cNvPr id="4" name="Marcador de Posição do Texto 3">
+            <a:extLst>
+              <a:ext uri="{FF2B5EF4-FFF2-40B4-BE49-F238E27FC236}">
+                <a16:creationId xmlns:a16="http://schemas.microsoft.com/office/drawing/2014/main" id="{CA5A9C57-498A-4BB8-BCF7-784643315D2E}"/>
+              </a:ext>
+            </a:extLst>
+          </p:cNvPr>
+          <p:cNvSpPr>
+            <a:spLocks noGrp="1"/>
+          </p:cNvSpPr>
+          <p:nvPr>
+            <p:ph type="body" sz="half" idx="2"/>
+          </p:nvPr>
+        </p:nvSpPr>
+        <p:spPr/>
         <p:txBody>
           <a:bodyPr/>
           <a:lstStyle/>
           <a:p>
-            <a:pPr>
-              <a:buFont typeface="Wingdings" panose="05000000000000000000" pitchFamily="2" charset="2"/>
-              <a:buChar char="q"/>
-            </a:pPr>
-            <a:r>
-              <a:rPr lang="pt-PT" dirty="0"/>
-              <a:t> Tornar o sistema “Leonardo” mais interativo, amigável e cativante;</a:t>
-            </a:r>
-          </a:p>
-          <a:p>
-            <a:pPr>
-              <a:buFont typeface="Wingdings" panose="05000000000000000000" pitchFamily="2" charset="2"/>
-              <a:buChar char="q"/>
-            </a:pPr>
-            <a:r>
-              <a:rPr lang="pt-PT" dirty="0"/>
-              <a:t> Capacidade de desenvolver diálogos mais expeditos com os utilizadores;</a:t>
-            </a:r>
-          </a:p>
-          <a:p>
-            <a:pPr>
-              <a:buFont typeface="Wingdings" panose="05000000000000000000" pitchFamily="2" charset="2"/>
-              <a:buChar char="q"/>
-            </a:pPr>
-            <a:r>
-              <a:rPr lang="pt-PT" dirty="0"/>
-              <a:t> Incentivo à utilização do sistema durante um processo de avaliação;</a:t>
-            </a:r>
+            <a:endParaRPr lang="pt-PT" dirty="0"/>
+          </a:p>
+        </p:txBody>
+      </p:sp>
+      <p:sp>
+        <p:nvSpPr>
+          <p:cNvPr id="17" name="Seta: Para a Esquerda e Para Cima 16">
+            <a:extLst>
+              <a:ext uri="{FF2B5EF4-FFF2-40B4-BE49-F238E27FC236}">
+                <a16:creationId xmlns:a16="http://schemas.microsoft.com/office/drawing/2014/main" id="{AA329F90-95E6-435C-9118-15AB0CA62966}"/>
+              </a:ext>
+            </a:extLst>
+          </p:cNvPr>
+          <p:cNvSpPr/>
+          <p:nvPr/>
+        </p:nvSpPr>
+        <p:spPr>
+          <a:xfrm rot="10800000">
+            <a:off x="6712131" y="759821"/>
+            <a:ext cx="1288869" cy="1695996"/>
+          </a:xfrm>
+          <a:prstGeom prst="leftUpArrow">
+            <a:avLst>
+              <a:gd name="adj1" fmla="val 7296"/>
+              <a:gd name="adj2" fmla="val 9509"/>
+              <a:gd name="adj3" fmla="val 13935"/>
+            </a:avLst>
+          </a:prstGeom>
+          <a:solidFill>
+            <a:srgbClr val="FF3300"/>
+          </a:solidFill>
+        </p:spPr>
+        <p:style>
+          <a:lnRef idx="3">
+            <a:schemeClr val="lt1"/>
+          </a:lnRef>
+          <a:fillRef idx="1">
+            <a:schemeClr val="accent1"/>
+          </a:fillRef>
+          <a:effectRef idx="1">
+            <a:schemeClr val="accent1"/>
+          </a:effectRef>
+          <a:fontRef idx="minor">
+            <a:schemeClr val="lt1"/>
+          </a:fontRef>
+        </p:style>
+        <p:txBody>
+          <a:bodyPr rtlCol="0" anchor="ctr"/>
+          <a:lstStyle/>
+          <a:p>
+            <a:pPr algn="ctr"/>
+            <a:endParaRPr lang="pt-PT"/>
           </a:p>
         </p:txBody>
       </p:sp>
     </p:spTree>
     <p:extLst>
       <p:ext uri="{BB962C8B-B14F-4D97-AF65-F5344CB8AC3E}">
-        <p14:creationId xmlns:p14="http://schemas.microsoft.com/office/powerpoint/2010/main" val="1730745467"/>
+        <p14:creationId xmlns:p14="http://schemas.microsoft.com/office/powerpoint/2010/main" val="1276444743"/>
       </p:ext>
     </p:extLst>
   </p:cSld>
@@ -7288,6 +6073,92 @@
   <p:transition spd="slow">
     <p:cover/>
   </p:transition>
+  <p:timing>
+    <p:tnLst>
+      <p:par>
+        <p:cTn id="1" dur="indefinite" restart="never" nodeType="tmRoot">
+          <p:childTnLst>
+            <p:seq concurrent="1" nextAc="seek">
+              <p:cTn id="2" dur="indefinite" nodeType="mainSeq">
+                <p:childTnLst>
+                  <p:par>
+                    <p:cTn id="3" fill="hold">
+                      <p:stCondLst>
+                        <p:cond delay="indefinite"/>
+                      </p:stCondLst>
+                      <p:childTnLst>
+                        <p:par>
+                          <p:cTn id="4" fill="hold">
+                            <p:stCondLst>
+                              <p:cond delay="0"/>
+                            </p:stCondLst>
+                            <p:childTnLst>
+                              <p:par>
+                                <p:cTn id="5" presetID="10" presetClass="entr" presetSubtype="0" fill="hold" grpId="0" nodeType="clickEffect">
+                                  <p:stCondLst>
+                                    <p:cond delay="0"/>
+                                  </p:stCondLst>
+                                  <p:childTnLst>
+                                    <p:set>
+                                      <p:cBhvr>
+                                        <p:cTn id="6" dur="1" fill="hold">
+                                          <p:stCondLst>
+                                            <p:cond delay="0"/>
+                                          </p:stCondLst>
+                                        </p:cTn>
+                                        <p:tgtEl>
+                                          <p:spTgt spid="17"/>
+                                        </p:tgtEl>
+                                        <p:attrNameLst>
+                                          <p:attrName>style.visibility</p:attrName>
+                                        </p:attrNameLst>
+                                      </p:cBhvr>
+                                      <p:to>
+                                        <p:strVal val="visible"/>
+                                      </p:to>
+                                    </p:set>
+                                    <p:animEffect transition="in" filter="fade">
+                                      <p:cBhvr>
+                                        <p:cTn id="7" dur="500"/>
+                                        <p:tgtEl>
+                                          <p:spTgt spid="17"/>
+                                        </p:tgtEl>
+                                      </p:cBhvr>
+                                    </p:animEffect>
+                                  </p:childTnLst>
+                                </p:cTn>
+                              </p:par>
+                            </p:childTnLst>
+                          </p:cTn>
+                        </p:par>
+                      </p:childTnLst>
+                    </p:cTn>
+                  </p:par>
+                </p:childTnLst>
+              </p:cTn>
+              <p:prevCondLst>
+                <p:cond evt="onPrev" delay="0">
+                  <p:tgtEl>
+                    <p:sldTgt/>
+                  </p:tgtEl>
+                </p:cond>
+              </p:prevCondLst>
+              <p:nextCondLst>
+                <p:cond evt="onNext" delay="0">
+                  <p:tgtEl>
+                    <p:sldTgt/>
+                  </p:tgtEl>
+                </p:cond>
+              </p:nextCondLst>
+            </p:seq>
+          </p:childTnLst>
+        </p:cTn>
+      </p:par>
+    </p:tnLst>
+    <p:bldLst>
+      <p:bldP spid="17" grpId="0" animBg="1"/>
+    </p:bldLst>
+  </p:timing>
 </p:sld>
 </file>
 
@@ -7313,7 +6184,7 @@
           <p:cNvPr id="2" name="Título 1">
             <a:extLst>
               <a:ext uri="{FF2B5EF4-FFF2-40B4-BE49-F238E27FC236}">
-                <a16:creationId xmlns:a16="http://schemas.microsoft.com/office/drawing/2014/main" id="{DAD0529E-691C-49B6-AF9B-BBF8CBF4DF87}"/>
+                <a16:creationId xmlns:a16="http://schemas.microsoft.com/office/drawing/2014/main" id="{D7D5C487-DAE2-4B7D-BFE9-AF4871322A8E}"/>
               </a:ext>
             </a:extLst>
           </p:cNvPr>
@@ -7330,24 +6201,18 @@
           <a:lstStyle/>
           <a:p>
             <a:r>
-              <a:rPr lang="pt-PT" dirty="0">
-                <a:solidFill>
-                  <a:schemeClr val="bg1">
-                    <a:lumMod val="50000"/>
-                  </a:schemeClr>
-                </a:solidFill>
-              </a:rPr>
-              <a:t>Objetivos</a:t>
-            </a:r>
-          </a:p>
-        </p:txBody>
-      </p:sp>
-      <p:sp>
-        <p:nvSpPr>
-          <p:cNvPr id="3" name="Marcador de Posição de Conteúdo 2">
+              <a:rPr lang="pt-PT" dirty="0"/>
+              <a:t>Funcionamento do Sistema</a:t>
+            </a:r>
+          </a:p>
+        </p:txBody>
+      </p:sp>
+      <p:sp>
+        <p:nvSpPr>
+          <p:cNvPr id="4" name="Marcador de Posição do Texto 3">
             <a:extLst>
               <a:ext uri="{FF2B5EF4-FFF2-40B4-BE49-F238E27FC236}">
-                <a16:creationId xmlns:a16="http://schemas.microsoft.com/office/drawing/2014/main" id="{1A6D056D-46A0-4D10-B863-EB94981A8C46}"/>
+                <a16:creationId xmlns:a16="http://schemas.microsoft.com/office/drawing/2014/main" id="{417E3BDF-5D19-4BAF-AEB7-734DBFCE7AA0}"/>
               </a:ext>
             </a:extLst>
           </p:cNvPr>
@@ -7355,63 +6220,63 @@
             <a:spLocks noGrp="1"/>
           </p:cNvSpPr>
           <p:nvPr>
+            <p:ph type="body" sz="half" idx="2"/>
+          </p:nvPr>
+        </p:nvSpPr>
+        <p:spPr/>
+        <p:txBody>
+          <a:bodyPr/>
+          <a:lstStyle/>
+          <a:p>
+            <a:endParaRPr lang="pt-PT" dirty="0"/>
+          </a:p>
+        </p:txBody>
+      </p:sp>
+      <p:pic>
+        <p:nvPicPr>
+          <p:cNvPr id="10" name="Marcador de Posição de Conteúdo 9" descr="Uma imagem com captura de ecrã&#10;&#10;Descrição gerada automaticamente">
+            <a:extLst>
+              <a:ext uri="{FF2B5EF4-FFF2-40B4-BE49-F238E27FC236}">
+                <a16:creationId xmlns:a16="http://schemas.microsoft.com/office/drawing/2014/main" id="{CFAC81AA-3555-4DC0-B65D-D5BE9823FB5C}"/>
+              </a:ext>
+            </a:extLst>
+          </p:cNvPr>
+          <p:cNvPicPr>
+            <a:picLocks noGrp="1" noChangeAspect="1"/>
+          </p:cNvPicPr>
+          <p:nvPr>
             <p:ph idx="1"/>
           </p:nvPr>
-        </p:nvSpPr>
-        <p:spPr>
-          <a:xfrm>
-            <a:off x="1097280" y="1929433"/>
-            <a:ext cx="10058400" cy="4023360"/>
-          </a:xfrm>
-        </p:spPr>
-        <p:txBody>
-          <a:bodyPr/>
-          <a:lstStyle/>
-          <a:p>
-            <a:pPr>
-              <a:buFont typeface="Wingdings" panose="05000000000000000000" pitchFamily="2" charset="2"/>
-              <a:buChar char="q"/>
-            </a:pPr>
-            <a:r>
-              <a:rPr lang="pt-PT" dirty="0"/>
-              <a:t> Criar um componente autónomo, capaz de interatuar com os outros módulos do sistema e de fácil integração (e manutenção) no sistema geral;</a:t>
-            </a:r>
-          </a:p>
-          <a:p>
-            <a:pPr>
-              <a:buFont typeface="Wingdings" panose="05000000000000000000" pitchFamily="2" charset="2"/>
-              <a:buChar char="q"/>
-            </a:pPr>
-            <a:r>
-              <a:rPr lang="pt-PT" dirty="0"/>
-              <a:t> Providenciar um sistema de geração de frases capaz de suportar os vários processos do sistema, em termos gerais e em termos de cada domínio de estudo, em particular;</a:t>
-            </a:r>
-          </a:p>
-          <a:p>
-            <a:pPr>
-              <a:buFont typeface="Wingdings" panose="05000000000000000000" pitchFamily="2" charset="2"/>
-              <a:buChar char="q"/>
-            </a:pPr>
-            <a:r>
-              <a:rPr lang="pt-PT" dirty="0"/>
-              <a:t> Desenvolver um sistema de diálogos que dispõe frases à medida do contexto e com alguma capacidade de adaptação a cada estado de um processo de avaliação.</a:t>
-            </a:r>
-          </a:p>
-        </p:txBody>
-      </p:sp>
+        </p:nvPicPr>
+        <p:blipFill>
+          <a:blip r:embed="rId2">
+            <a:extLst>
+              <a:ext uri="{28A0092B-C50C-407E-A947-70E740481C1C}">
+                <a14:useLocalDpi xmlns:a14="http://schemas.microsoft.com/office/drawing/2010/main" val="0"/>
+              </a:ext>
+            </a:extLst>
+          </a:blip>
+          <a:stretch>
+            <a:fillRect/>
+          </a:stretch>
+        </p:blipFill>
+        <p:spPr>
+          <a:xfrm>
+            <a:off x="4696327" y="252372"/>
+            <a:ext cx="6625388" cy="6353255"/>
+          </a:xfrm>
+        </p:spPr>
+      </p:pic>
     </p:spTree>
     <p:extLst>
       <p:ext uri="{BB962C8B-B14F-4D97-AF65-F5344CB8AC3E}">
-        <p14:creationId xmlns:p14="http://schemas.microsoft.com/office/powerpoint/2010/main" val="1634778810"/>
+        <p14:creationId xmlns:p14="http://schemas.microsoft.com/office/powerpoint/2010/main" val="4085756810"/>
       </p:ext>
     </p:extLst>
   </p:cSld>
   <p:clrMapOvr>
     <a:masterClrMapping/>
   </p:clrMapOvr>
-  <p:transition spd="slow">
-    <p:cover/>
-  </p:transition>
 </p:sld>
 </file>
 
@@ -7437,7 +6302,7 @@
           <p:cNvPr id="2" name="Título 1">
             <a:extLst>
               <a:ext uri="{FF2B5EF4-FFF2-40B4-BE49-F238E27FC236}">
-                <a16:creationId xmlns:a16="http://schemas.microsoft.com/office/drawing/2014/main" id="{C9DA4474-206D-415E-90A2-22F6698BD392}"/>
+                <a16:creationId xmlns:a16="http://schemas.microsoft.com/office/drawing/2014/main" id="{D7D5C487-DAE2-4B7D-BFE9-AF4871322A8E}"/>
               </a:ext>
             </a:extLst>
           </p:cNvPr>
@@ -7454,24 +6319,215 @@
           <a:lstStyle/>
           <a:p>
             <a:r>
-              <a:rPr lang="pt-PT" dirty="0">
-                <a:solidFill>
-                  <a:schemeClr val="bg1">
-                    <a:lumMod val="50000"/>
-                  </a:schemeClr>
-                </a:solidFill>
-              </a:rPr>
-              <a:t>Apresentação do Componente</a:t>
-            </a:r>
+              <a:rPr lang="pt-PT" dirty="0"/>
+              <a:t>Funcionamento do Sistema</a:t>
+            </a:r>
+          </a:p>
+        </p:txBody>
+      </p:sp>
+      <p:sp>
+        <p:nvSpPr>
+          <p:cNvPr id="4" name="Marcador de Posição do Texto 3">
+            <a:extLst>
+              <a:ext uri="{FF2B5EF4-FFF2-40B4-BE49-F238E27FC236}">
+                <a16:creationId xmlns:a16="http://schemas.microsoft.com/office/drawing/2014/main" id="{417E3BDF-5D19-4BAF-AEB7-734DBFCE7AA0}"/>
+              </a:ext>
+            </a:extLst>
+          </p:cNvPr>
+          <p:cNvSpPr>
+            <a:spLocks noGrp="1"/>
+          </p:cNvSpPr>
+          <p:nvPr>
+            <p:ph type="body" sz="half" idx="2"/>
+          </p:nvPr>
+        </p:nvSpPr>
+        <p:spPr>
+          <a:xfrm>
+            <a:off x="457200" y="2858702"/>
+            <a:ext cx="3441032" cy="3659748"/>
+          </a:xfrm>
+        </p:spPr>
+        <p:txBody>
+          <a:bodyPr>
+            <a:normAutofit fontScale="25000" lnSpcReduction="20000"/>
+          </a:bodyPr>
+          <a:lstStyle/>
+          <a:p>
+            <a:pPr>
+              <a:lnSpc>
+                <a:spcPct val="120000"/>
+              </a:lnSpc>
+            </a:pPr>
+            <a:r>
+              <a:rPr lang="sv-SE" sz="4800" dirty="0"/>
+              <a:t>{</a:t>
+            </a:r>
+            <a:br>
+              <a:rPr lang="sv-SE" sz="4800" dirty="0"/>
+            </a:br>
+            <a:r>
+              <a:rPr lang="sv-SE" sz="4800" dirty="0"/>
+              <a:t> "username": 1,</a:t>
+            </a:r>
+            <a:br>
+              <a:rPr lang="sv-SE" sz="4800" dirty="0"/>
+            </a:br>
+            <a:r>
+              <a:rPr lang="sv-SE" sz="4800" dirty="0"/>
+              <a:t> "language": 1,</a:t>
+            </a:r>
+            <a:br>
+              <a:rPr lang="sv-SE" sz="4800" dirty="0"/>
+            </a:br>
+            <a:r>
+              <a:rPr lang="sv-SE" sz="4800" dirty="0"/>
+              <a:t>  "domain": 1,</a:t>
+            </a:r>
+            <a:br>
+              <a:rPr lang="sv-SE" sz="4800" dirty="0"/>
+            </a:br>
+            <a:r>
+              <a:rPr lang="sv-SE" sz="4800" dirty="0"/>
+              <a:t>  "subdomain": 1,</a:t>
+            </a:r>
+            <a:br>
+              <a:rPr lang="sv-SE" sz="4800" dirty="0"/>
+            </a:br>
+            <a:r>
+              <a:rPr lang="sv-SE" sz="4800" dirty="0"/>
+              <a:t>  "answer": 1,</a:t>
+            </a:r>
+            <a:br>
+              <a:rPr lang="sv-SE" sz="4800" dirty="0"/>
+            </a:br>
+            <a:r>
+              <a:rPr lang="sv-SE" sz="4800" dirty="0"/>
+              <a:t>  "question_lvl": 3,</a:t>
+            </a:r>
+            <a:br>
+              <a:rPr lang="sv-SE" sz="4800" dirty="0"/>
+            </a:br>
+            <a:r>
+              <a:rPr lang="sv-SE" sz="4800" dirty="0"/>
+              <a:t>  "student_lvl": 4,</a:t>
+            </a:r>
+            <a:br>
+              <a:rPr lang="sv-SE" sz="4800" dirty="0"/>
+            </a:br>
+            <a:r>
+              <a:rPr lang="sv-SE" sz="4800" dirty="0"/>
+              <a:t>  "state": 123456,</a:t>
+            </a:r>
+            <a:br>
+              <a:rPr lang="sv-SE" sz="4800" dirty="0"/>
+            </a:br>
+            <a:r>
+              <a:rPr lang="sv-SE" sz="4800" dirty="0"/>
+              <a:t>  "skill_domain": 4,</a:t>
+            </a:r>
+            <a:br>
+              <a:rPr lang="sv-SE" sz="4800" dirty="0"/>
+            </a:br>
+            <a:r>
+              <a:rPr lang="sv-SE" sz="4800" dirty="0"/>
+              <a:t>  "performance_domain": 4,</a:t>
+            </a:r>
+            <a:br>
+              <a:rPr lang="sv-SE" sz="4800" dirty="0"/>
+            </a:br>
+            <a:r>
+              <a:rPr lang="sv-SE" sz="4800" dirty="0"/>
+              <a:t>  "skill_subdomain": 3,</a:t>
+            </a:r>
+            <a:br>
+              <a:rPr lang="sv-SE" sz="4800" dirty="0"/>
+            </a:br>
+            <a:r>
+              <a:rPr lang="sv-SE" sz="4800" dirty="0"/>
+              <a:t>  "performance_subdomain": 4,</a:t>
+            </a:r>
+            <a:br>
+              <a:rPr lang="sv-SE" sz="4800" dirty="0"/>
+            </a:br>
+            <a:r>
+              <a:rPr lang="sv-SE" sz="4800" dirty="0"/>
+              <a:t>  "time": 3,</a:t>
+            </a:r>
+            <a:br>
+              <a:rPr lang="sv-SE" sz="4800" dirty="0"/>
+            </a:br>
+            <a:r>
+              <a:rPr lang="sv-SE" sz="4800" dirty="0"/>
+              <a:t>  "typeQ": " "</a:t>
+            </a:r>
+            <a:br>
+              <a:rPr lang="sv-SE" sz="4800" dirty="0"/>
+            </a:br>
+            <a:r>
+              <a:rPr lang="sv-SE" sz="4800" dirty="0"/>
+              <a:t>}</a:t>
+            </a:r>
+            <a:endParaRPr lang="sv-SE" dirty="0"/>
+          </a:p>
+          <a:p>
+            <a:endParaRPr lang="sv-SE" dirty="0"/>
+          </a:p>
+          <a:p>
+            <a:pPr>
+              <a:lnSpc>
+                <a:spcPct val="120000"/>
+              </a:lnSpc>
+            </a:pPr>
+            <a:r>
+              <a:rPr lang="sv-SE" sz="5200" dirty="0"/>
+              <a:t>patttern = ["1", "1", "1", "1", "1", "3", "4",</a:t>
+            </a:r>
+            <a:br>
+              <a:rPr lang="sv-SE" sz="5200" dirty="0"/>
+            </a:br>
+            <a:r>
+              <a:rPr lang="sv-SE" sz="5200" dirty="0"/>
+              <a:t>                    "123456", "4", "4", "3", "4", "3", ""]</a:t>
+            </a:r>
+          </a:p>
+        </p:txBody>
+      </p:sp>
+      <p:sp>
+        <p:nvSpPr>
+          <p:cNvPr id="20" name="Marcador de Posição de Conteúdo 19">
+            <a:extLst>
+              <a:ext uri="{FF2B5EF4-FFF2-40B4-BE49-F238E27FC236}">
+                <a16:creationId xmlns:a16="http://schemas.microsoft.com/office/drawing/2014/main" id="{E6D76E72-3E5E-4298-ADA6-0607B4B80320}"/>
+              </a:ext>
+            </a:extLst>
+          </p:cNvPr>
+          <p:cNvSpPr>
+            <a:spLocks noGrp="1"/>
+          </p:cNvSpPr>
+          <p:nvPr>
+            <p:ph idx="1"/>
+          </p:nvPr>
+        </p:nvSpPr>
+        <p:spPr>
+          <a:xfrm>
+            <a:off x="4800600" y="1911352"/>
+            <a:ext cx="6492240" cy="4077967"/>
+          </a:xfrm>
+        </p:spPr>
+        <p:txBody>
+          <a:bodyPr/>
+          <a:lstStyle/>
+          <a:p>
+            <a:endParaRPr lang="pt-PT" dirty="0"/>
           </a:p>
         </p:txBody>
       </p:sp>
       <p:pic>
         <p:nvPicPr>
-          <p:cNvPr id="5" name="Imagem 4">
+          <p:cNvPr id="22" name="Marcador de Posição de Conteúdo 9" descr="Uma imagem com captura de ecrã&#10;&#10;Descrição gerada automaticamente">
             <a:extLst>
               <a:ext uri="{FF2B5EF4-FFF2-40B4-BE49-F238E27FC236}">
-                <a16:creationId xmlns:a16="http://schemas.microsoft.com/office/drawing/2014/main" id="{A071BA8A-8BE0-477E-BBFF-00AE52C4F5FC}"/>
+                <a16:creationId xmlns:a16="http://schemas.microsoft.com/office/drawing/2014/main" id="{50375737-C7DA-43B7-A2F5-C20ED74572B3}"/>
               </a:ext>
             </a:extLst>
           </p:cNvPr>
@@ -7481,7 +6537,7 @@
           <p:nvPr/>
         </p:nvPicPr>
         <p:blipFill>
-          <a:blip r:embed="rId3">
+          <a:blip r:embed="rId2">
             <a:extLst>
               <a:ext uri="{28A0092B-C50C-407E-A947-70E740481C1C}">
                 <a14:useLocalDpi xmlns:a14="http://schemas.microsoft.com/office/drawing/2010/main" val="0"/>
@@ -7494,8 +6550,8 @@
         </p:blipFill>
         <p:spPr>
           <a:xfrm>
-            <a:off x="2061599" y="3130967"/>
-            <a:ext cx="8068801" cy="3105583"/>
+            <a:off x="4696327" y="252372"/>
+            <a:ext cx="6625388" cy="6353255"/>
           </a:xfrm>
           <a:prstGeom prst="rect">
             <a:avLst/>
@@ -7504,93 +6560,130 @@
       </p:pic>
       <p:sp>
         <p:nvSpPr>
-          <p:cNvPr id="7" name="Marcador de Posição de Conteúdo 2">
+          <p:cNvPr id="55" name="Retângulo: Cantos Arredondados 54">
             <a:extLst>
               <a:ext uri="{FF2B5EF4-FFF2-40B4-BE49-F238E27FC236}">
-                <a16:creationId xmlns:a16="http://schemas.microsoft.com/office/drawing/2014/main" id="{3EC6D872-E846-4670-BF08-540C59BD27FC}"/>
+                <a16:creationId xmlns:a16="http://schemas.microsoft.com/office/drawing/2014/main" id="{692B1793-D483-4C69-8CC5-87CBBA2CD237}"/>
               </a:ext>
             </a:extLst>
           </p:cNvPr>
-          <p:cNvSpPr>
-            <a:spLocks noGrp="1"/>
-          </p:cNvSpPr>
-          <p:nvPr>
-            <p:ph idx="1"/>
-          </p:nvPr>
-        </p:nvSpPr>
-        <p:spPr>
-          <a:xfrm>
-            <a:off x="1097280" y="1930401"/>
-            <a:ext cx="10058400" cy="1450757"/>
-          </a:xfrm>
-        </p:spPr>
-        <p:txBody>
-          <a:bodyPr>
-            <a:normAutofit fontScale="92500" lnSpcReduction="10000"/>
-          </a:bodyPr>
-          <a:lstStyle/>
-          <a:p>
-            <a:pPr>
-              <a:buFont typeface="Wingdings" panose="05000000000000000000" pitchFamily="2" charset="2"/>
-              <a:buChar char="q"/>
-            </a:pPr>
-            <a:r>
-              <a:rPr lang="pt-PT" dirty="0"/>
-              <a:t> Funcionalidade por subcomponente:</a:t>
-            </a:r>
-          </a:p>
-          <a:p>
-            <a:pPr lvl="1">
-              <a:buFont typeface="Wingdings" panose="05000000000000000000" pitchFamily="2" charset="2"/>
-              <a:buChar char="q"/>
-            </a:pPr>
-            <a:r>
-              <a:rPr lang="pt-PT" dirty="0"/>
-              <a:t> Análise do Padrão: Analisar padrão vindo de outra componente e extração/conversão de informação útil;</a:t>
-            </a:r>
-          </a:p>
-          <a:p>
-            <a:pPr lvl="1">
-              <a:buFont typeface="Wingdings" panose="05000000000000000000" pitchFamily="2" charset="2"/>
-              <a:buChar char="q"/>
-            </a:pPr>
-            <a:r>
-              <a:rPr lang="pt-PT" dirty="0"/>
-              <a:t> Motor de Regras: Análise de dados provenientes do padrão e realização de testes, comparando esses dados com as condições das regras, do motor de regras</a:t>
-            </a:r>
-          </a:p>
-          <a:p>
-            <a:pPr lvl="1">
-              <a:buFont typeface="Wingdings" panose="05000000000000000000" pitchFamily="2" charset="2"/>
-              <a:buChar char="q"/>
-            </a:pPr>
-            <a:r>
-              <a:rPr lang="pt-PT" dirty="0"/>
-              <a:t> Seleção de Diálogo: Através das estruturas de decisão, selecionar qual a frase a enviar ao utilizador.</a:t>
-            </a:r>
-          </a:p>
-          <a:p>
-            <a:pPr>
-              <a:buFont typeface="Wingdings" panose="05000000000000000000" pitchFamily="2" charset="2"/>
-              <a:buChar char="q"/>
-            </a:pPr>
-            <a:endParaRPr lang="pt-PT" dirty="0"/>
-          </a:p>
-        </p:txBody>
-      </p:sp>
+          <p:cNvSpPr/>
+          <p:nvPr/>
+        </p:nvSpPr>
+        <p:spPr>
+          <a:xfrm>
+            <a:off x="6694227" y="1617260"/>
+            <a:ext cx="232012" cy="294092"/>
+          </a:xfrm>
+          <a:prstGeom prst="roundRect">
+            <a:avLst/>
+          </a:prstGeom>
+          <a:solidFill>
+            <a:schemeClr val="bg1"/>
+          </a:solidFill>
+          <a:ln>
+            <a:solidFill>
+              <a:schemeClr val="bg1"/>
+            </a:solidFill>
+          </a:ln>
+        </p:spPr>
+        <p:style>
+          <a:lnRef idx="2">
+            <a:schemeClr val="accent1">
+              <a:shade val="50000"/>
+            </a:schemeClr>
+          </a:lnRef>
+          <a:fillRef idx="1">
+            <a:schemeClr val="accent1"/>
+          </a:fillRef>
+          <a:effectRef idx="0">
+            <a:schemeClr val="accent1"/>
+          </a:effectRef>
+          <a:fontRef idx="minor">
+            <a:schemeClr val="lt1"/>
+          </a:fontRef>
+        </p:style>
+        <p:txBody>
+          <a:bodyPr rtlCol="0" anchor="ctr"/>
+          <a:lstStyle/>
+          <a:p>
+            <a:pPr algn="ctr"/>
+            <a:endParaRPr lang="pt-PT"/>
+          </a:p>
+        </p:txBody>
+      </p:sp>
+      <p:cxnSp>
+        <p:nvCxnSpPr>
+          <p:cNvPr id="48" name="Conexão: Ângulo Reto 47">
+            <a:extLst>
+              <a:ext uri="{FF2B5EF4-FFF2-40B4-BE49-F238E27FC236}">
+                <a16:creationId xmlns:a16="http://schemas.microsoft.com/office/drawing/2014/main" id="{F286C0CB-979B-4840-8491-D11A1985459F}"/>
+              </a:ext>
+            </a:extLst>
+          </p:cNvPr>
+          <p:cNvCxnSpPr>
+            <a:cxnSpLocks/>
+          </p:cNvCxnSpPr>
+          <p:nvPr/>
+        </p:nvCxnSpPr>
+        <p:spPr>
+          <a:xfrm rot="16200000" flipH="1">
+            <a:off x="5985634" y="1147502"/>
+            <a:ext cx="1103420" cy="545778"/>
+          </a:xfrm>
+          <a:prstGeom prst="bentConnector3">
+            <a:avLst>
+              <a:gd name="adj1" fmla="val 63606"/>
+            </a:avLst>
+          </a:prstGeom>
+          <a:ln w="28575">
+            <a:solidFill>
+              <a:srgbClr val="FF3300"/>
+            </a:solidFill>
+            <a:tailEnd type="triangle"/>
+          </a:ln>
+          <a:effectLst>
+            <a:glow rad="63500">
+              <a:schemeClr val="accent2">
+                <a:satMod val="175000"/>
+                <a:alpha val="40000"/>
+              </a:schemeClr>
+            </a:glow>
+          </a:effectLst>
+        </p:spPr>
+        <p:style>
+          <a:lnRef idx="1">
+            <a:schemeClr val="accent1"/>
+          </a:lnRef>
+          <a:fillRef idx="0">
+            <a:schemeClr val="accent1"/>
+          </a:fillRef>
+          <a:effectRef idx="0">
+            <a:schemeClr val="accent1"/>
+          </a:effectRef>
+          <a:fontRef idx="minor">
+            <a:schemeClr val="tx1"/>
+          </a:fontRef>
+        </p:style>
+      </p:cxnSp>
     </p:spTree>
     <p:extLst>
       <p:ext uri="{BB962C8B-B14F-4D97-AF65-F5344CB8AC3E}">
-        <p14:creationId xmlns:p14="http://schemas.microsoft.com/office/powerpoint/2010/main" val="3735119211"/>
+        <p14:creationId xmlns:p14="http://schemas.microsoft.com/office/powerpoint/2010/main" val="938908307"/>
       </p:ext>
     </p:extLst>
   </p:cSld>
   <p:clrMapOvr>
     <a:masterClrMapping/>
   </p:clrMapOvr>
-  <p:transition spd="slow">
-    <p:cover/>
-  </p:transition>
+  <mc:AlternateContent xmlns:mc="http://schemas.openxmlformats.org/markup-compatibility/2006">
+    <mc:Choice xmlns:p14="http://schemas.microsoft.com/office/powerpoint/2010/main" Requires="p14">
+      <p:transition p14:dur="10"/>
+    </mc:Choice>
+    <mc:Fallback>
+      <p:transition/>
+    </mc:Fallback>
+  </mc:AlternateContent>
 </p:sld>
 </file>
 
@@ -7616,7 +6709,7 @@
           <p:cNvPr id="2" name="Título 1">
             <a:extLst>
               <a:ext uri="{FF2B5EF4-FFF2-40B4-BE49-F238E27FC236}">
-                <a16:creationId xmlns:a16="http://schemas.microsoft.com/office/drawing/2014/main" id="{C9DA4474-206D-415E-90A2-22F6698BD392}"/>
+                <a16:creationId xmlns:a16="http://schemas.microsoft.com/office/drawing/2014/main" id="{D7D5C487-DAE2-4B7D-BFE9-AF4871322A8E}"/>
               </a:ext>
             </a:extLst>
           </p:cNvPr>
@@ -7633,24 +6726,259 @@
           <a:lstStyle/>
           <a:p>
             <a:r>
-              <a:rPr lang="pt-PT" dirty="0">
+              <a:rPr lang="pt-PT" dirty="0"/>
+              <a:t>Funcionamento do Sistema</a:t>
+            </a:r>
+          </a:p>
+        </p:txBody>
+      </p:sp>
+      <p:sp>
+        <p:nvSpPr>
+          <p:cNvPr id="4" name="Marcador de Posição do Texto 3">
+            <a:extLst>
+              <a:ext uri="{FF2B5EF4-FFF2-40B4-BE49-F238E27FC236}">
+                <a16:creationId xmlns:a16="http://schemas.microsoft.com/office/drawing/2014/main" id="{417E3BDF-5D19-4BAF-AEB7-734DBFCE7AA0}"/>
+              </a:ext>
+            </a:extLst>
+          </p:cNvPr>
+          <p:cNvSpPr>
+            <a:spLocks noGrp="1"/>
+          </p:cNvSpPr>
+          <p:nvPr>
+            <p:ph type="body" sz="half" idx="2"/>
+          </p:nvPr>
+        </p:nvSpPr>
+        <p:spPr>
+          <a:xfrm>
+            <a:off x="457200" y="2858701"/>
+            <a:ext cx="3441032" cy="3746925"/>
+          </a:xfrm>
+        </p:spPr>
+        <p:txBody>
+          <a:bodyPr>
+            <a:normAutofit fontScale="25000" lnSpcReduction="20000"/>
+          </a:bodyPr>
+          <a:lstStyle/>
+          <a:p>
+            <a:pPr>
+              <a:lnSpc>
+                <a:spcPct val="120000"/>
+              </a:lnSpc>
+            </a:pPr>
+            <a:r>
+              <a:rPr lang="sv-SE" sz="4800" dirty="0"/>
+              <a:t>{</a:t>
+            </a:r>
+            <a:br>
+              <a:rPr lang="sv-SE" sz="4800" dirty="0"/>
+            </a:br>
+            <a:r>
+              <a:rPr lang="sv-SE" sz="4800" dirty="0"/>
+              <a:t> "username": </a:t>
+            </a:r>
+            <a:r>
+              <a:rPr lang="sv-SE" sz="4800" dirty="0">
                 <a:solidFill>
-                  <a:schemeClr val="bg1">
-                    <a:lumMod val="50000"/>
-                  </a:schemeClr>
+                  <a:srgbClr val="FF0000"/>
                 </a:solidFill>
               </a:rPr>
-              <a:t>Apresentação do Componente</a:t>
-            </a:r>
+              <a:t>1</a:t>
+            </a:r>
+            <a:r>
+              <a:rPr lang="sv-SE" sz="4800" dirty="0"/>
+              <a:t>,</a:t>
+            </a:r>
+            <a:br>
+              <a:rPr lang="sv-SE" sz="4800" dirty="0"/>
+            </a:br>
+            <a:r>
+              <a:rPr lang="sv-SE" sz="4800" dirty="0"/>
+              <a:t> "language": 1,</a:t>
+            </a:r>
+            <a:br>
+              <a:rPr lang="sv-SE" sz="4800" dirty="0"/>
+            </a:br>
+            <a:r>
+              <a:rPr lang="sv-SE" sz="4800" dirty="0"/>
+              <a:t>  "domain": 1,</a:t>
+            </a:r>
+            <a:br>
+              <a:rPr lang="sv-SE" sz="4800" dirty="0"/>
+            </a:br>
+            <a:r>
+              <a:rPr lang="sv-SE" sz="4800" dirty="0"/>
+              <a:t>  "subdomain": 1,</a:t>
+            </a:r>
+            <a:br>
+              <a:rPr lang="sv-SE" sz="4800" dirty="0"/>
+            </a:br>
+            <a:r>
+              <a:rPr lang="sv-SE" sz="4800" dirty="0"/>
+              <a:t>  "answer": 1,</a:t>
+            </a:r>
+            <a:br>
+              <a:rPr lang="sv-SE" sz="4800" dirty="0"/>
+            </a:br>
+            <a:r>
+              <a:rPr lang="sv-SE" sz="4800" dirty="0"/>
+              <a:t>  "question_lvl": 3,</a:t>
+            </a:r>
+            <a:br>
+              <a:rPr lang="sv-SE" sz="4800" dirty="0"/>
+            </a:br>
+            <a:r>
+              <a:rPr lang="sv-SE" sz="4800" dirty="0"/>
+              <a:t>  "student_lvl": 4,</a:t>
+            </a:r>
+            <a:br>
+              <a:rPr lang="sv-SE" sz="4800" dirty="0"/>
+            </a:br>
+            <a:r>
+              <a:rPr lang="sv-SE" sz="4800" dirty="0"/>
+              <a:t>  "state": 123456,</a:t>
+            </a:r>
+            <a:br>
+              <a:rPr lang="sv-SE" sz="4800" dirty="0"/>
+            </a:br>
+            <a:r>
+              <a:rPr lang="sv-SE" sz="4800" dirty="0"/>
+              <a:t>  "skill_domain": </a:t>
+            </a:r>
+            <a:r>
+              <a:rPr lang="sv-SE" sz="4800" dirty="0">
+                <a:solidFill>
+                  <a:srgbClr val="FF0000"/>
+                </a:solidFill>
+              </a:rPr>
+              <a:t>4</a:t>
+            </a:r>
+            <a:r>
+              <a:rPr lang="sv-SE" sz="4800" dirty="0"/>
+              <a:t>,</a:t>
+            </a:r>
+            <a:br>
+              <a:rPr lang="sv-SE" sz="4800" dirty="0"/>
+            </a:br>
+            <a:r>
+              <a:rPr lang="sv-SE" sz="4800" dirty="0"/>
+              <a:t>  "performance_domain": 4,</a:t>
+            </a:r>
+            <a:br>
+              <a:rPr lang="sv-SE" sz="4800" dirty="0"/>
+            </a:br>
+            <a:r>
+              <a:rPr lang="sv-SE" sz="4800" dirty="0"/>
+              <a:t>  "skill_subdomain": 3,</a:t>
+            </a:r>
+            <a:br>
+              <a:rPr lang="sv-SE" sz="4800" dirty="0"/>
+            </a:br>
+            <a:r>
+              <a:rPr lang="sv-SE" sz="4800" dirty="0"/>
+              <a:t>  "performance_subdomain": 4,</a:t>
+            </a:r>
+            <a:br>
+              <a:rPr lang="sv-SE" sz="4800" dirty="0"/>
+            </a:br>
+            <a:r>
+              <a:rPr lang="sv-SE" sz="4800" dirty="0"/>
+              <a:t>  "time": 3,</a:t>
+            </a:r>
+            <a:br>
+              <a:rPr lang="sv-SE" sz="4800" dirty="0"/>
+            </a:br>
+            <a:r>
+              <a:rPr lang="sv-SE" sz="4800" dirty="0"/>
+              <a:t>  "typeQ": </a:t>
+            </a:r>
+            <a:r>
+              <a:rPr lang="sv-SE" sz="4800" dirty="0">
+                <a:solidFill>
+                  <a:schemeClr val="bg1"/>
+                </a:solidFill>
+              </a:rPr>
+              <a:t>"</a:t>
+            </a:r>
+            <a:r>
+              <a:rPr lang="sv-SE" sz="4800" dirty="0">
+                <a:solidFill>
+                  <a:srgbClr val="FF0000"/>
+                </a:solidFill>
+              </a:rPr>
+              <a:t>greetingsTLate</a:t>
+            </a:r>
+            <a:r>
+              <a:rPr lang="sv-SE" sz="4800" dirty="0"/>
+              <a:t>"</a:t>
+            </a:r>
+            <a:br>
+              <a:rPr lang="sv-SE" sz="4800" dirty="0"/>
+            </a:br>
+            <a:r>
+              <a:rPr lang="sv-SE" sz="4800" dirty="0"/>
+              <a:t>}</a:t>
+            </a:r>
+            <a:endParaRPr lang="sv-SE" dirty="0"/>
+          </a:p>
+          <a:p>
+            <a:endParaRPr lang="sv-SE" dirty="0"/>
+          </a:p>
+          <a:p>
+            <a:pPr>
+              <a:lnSpc>
+                <a:spcPct val="120000"/>
+              </a:lnSpc>
+            </a:pPr>
+            <a:r>
+              <a:rPr lang="sv-SE" sz="5200" dirty="0"/>
+              <a:t>patttern = ["1", "1", "1", "1", "1", "3", "4",</a:t>
+            </a:r>
+            <a:br>
+              <a:rPr lang="sv-SE" sz="5200" dirty="0"/>
+            </a:br>
+            <a:r>
+              <a:rPr lang="sv-SE" sz="5200" dirty="0"/>
+              <a:t>                    "123456", "4", "4", "3", "4", "3", "1"]</a:t>
+            </a:r>
+          </a:p>
+        </p:txBody>
+      </p:sp>
+      <p:sp>
+        <p:nvSpPr>
+          <p:cNvPr id="20" name="Marcador de Posição de Conteúdo 19">
+            <a:extLst>
+              <a:ext uri="{FF2B5EF4-FFF2-40B4-BE49-F238E27FC236}">
+                <a16:creationId xmlns:a16="http://schemas.microsoft.com/office/drawing/2014/main" id="{E6D76E72-3E5E-4298-ADA6-0607B4B80320}"/>
+              </a:ext>
+            </a:extLst>
+          </p:cNvPr>
+          <p:cNvSpPr>
+            <a:spLocks noGrp="1"/>
+          </p:cNvSpPr>
+          <p:nvPr>
+            <p:ph idx="1"/>
+          </p:nvPr>
+        </p:nvSpPr>
+        <p:spPr>
+          <a:xfrm>
+            <a:off x="4800600" y="1911352"/>
+            <a:ext cx="6492240" cy="4077967"/>
+          </a:xfrm>
+        </p:spPr>
+        <p:txBody>
+          <a:bodyPr/>
+          <a:lstStyle/>
+          <a:p>
+            <a:endParaRPr lang="pt-PT" dirty="0"/>
           </a:p>
         </p:txBody>
       </p:sp>
       <p:pic>
         <p:nvPicPr>
-          <p:cNvPr id="5" name="Imagem 4">
+          <p:cNvPr id="22" name="Marcador de Posição de Conteúdo 9" descr="Uma imagem com captura de ecrã&#10;&#10;Descrição gerada automaticamente">
             <a:extLst>
               <a:ext uri="{FF2B5EF4-FFF2-40B4-BE49-F238E27FC236}">
-                <a16:creationId xmlns:a16="http://schemas.microsoft.com/office/drawing/2014/main" id="{A071BA8A-8BE0-477E-BBFF-00AE52C4F5FC}"/>
+                <a16:creationId xmlns:a16="http://schemas.microsoft.com/office/drawing/2014/main" id="{50375737-C7DA-43B7-A2F5-C20ED74572B3}"/>
               </a:ext>
             </a:extLst>
           </p:cNvPr>
@@ -7660,7 +6988,7 @@
           <p:nvPr/>
         </p:nvPicPr>
         <p:blipFill>
-          <a:blip r:embed="rId3">
+          <a:blip r:embed="rId2">
             <a:extLst>
               <a:ext uri="{28A0092B-C50C-407E-A947-70E740481C1C}">
                 <a14:useLocalDpi xmlns:a14="http://schemas.microsoft.com/office/drawing/2010/main" val="0"/>
@@ -7673,225 +7001,24 @@
         </p:blipFill>
         <p:spPr>
           <a:xfrm>
-            <a:off x="2061599" y="2649491"/>
-            <a:ext cx="8068801" cy="3105583"/>
+            <a:off x="4696327" y="252372"/>
+            <a:ext cx="6625388" cy="6353255"/>
           </a:xfrm>
           <a:prstGeom prst="rect">
             <a:avLst/>
           </a:prstGeom>
         </p:spPr>
       </p:pic>
-      <p:sp>
-        <p:nvSpPr>
-          <p:cNvPr id="3" name="Oval 2">
-            <a:extLst>
-              <a:ext uri="{FF2B5EF4-FFF2-40B4-BE49-F238E27FC236}">
-                <a16:creationId xmlns:a16="http://schemas.microsoft.com/office/drawing/2014/main" id="{29E9DD23-BBFC-4EBB-BAD0-425A92F9B41A}"/>
-              </a:ext>
-            </a:extLst>
-          </p:cNvPr>
-          <p:cNvSpPr/>
-          <p:nvPr/>
-        </p:nvSpPr>
-        <p:spPr>
-          <a:xfrm>
-            <a:off x="10243820" y="3466254"/>
-            <a:ext cx="1219200" cy="1209041"/>
-          </a:xfrm>
-          <a:prstGeom prst="ellipse">
-            <a:avLst/>
-          </a:prstGeom>
-        </p:spPr>
-        <p:style>
-          <a:lnRef idx="3">
-            <a:schemeClr val="lt1"/>
-          </a:lnRef>
-          <a:fillRef idx="1">
-            <a:schemeClr val="accent1"/>
-          </a:fillRef>
-          <a:effectRef idx="1">
-            <a:schemeClr val="accent1"/>
-          </a:effectRef>
-          <a:fontRef idx="minor">
-            <a:schemeClr val="lt1"/>
-          </a:fontRef>
-        </p:style>
-        <p:txBody>
-          <a:bodyPr rtlCol="0" anchor="ctr"/>
-          <a:lstStyle/>
-          <a:p>
-            <a:pPr algn="ctr"/>
-            <a:endParaRPr lang="pt-PT"/>
-          </a:p>
-        </p:txBody>
-      </p:sp>
-      <p:sp>
-        <p:nvSpPr>
-          <p:cNvPr id="6" name="Oval 5">
-            <a:extLst>
-              <a:ext uri="{FF2B5EF4-FFF2-40B4-BE49-F238E27FC236}">
-                <a16:creationId xmlns:a16="http://schemas.microsoft.com/office/drawing/2014/main" id="{73DA8051-3890-44E6-B9AC-2008EEE802ED}"/>
-              </a:ext>
-            </a:extLst>
-          </p:cNvPr>
-          <p:cNvSpPr/>
-          <p:nvPr/>
-        </p:nvSpPr>
-        <p:spPr>
-          <a:xfrm>
-            <a:off x="639199" y="3466254"/>
-            <a:ext cx="1219200" cy="1209041"/>
-          </a:xfrm>
-          <a:prstGeom prst="ellipse">
-            <a:avLst/>
-          </a:prstGeom>
-        </p:spPr>
-        <p:style>
-          <a:lnRef idx="3">
-            <a:schemeClr val="lt1"/>
-          </a:lnRef>
-          <a:fillRef idx="1">
-            <a:schemeClr val="accent1"/>
-          </a:fillRef>
-          <a:effectRef idx="1">
-            <a:schemeClr val="accent1"/>
-          </a:effectRef>
-          <a:fontRef idx="minor">
-            <a:schemeClr val="lt1"/>
-          </a:fontRef>
-        </p:style>
-        <p:txBody>
-          <a:bodyPr rtlCol="0" anchor="ctr"/>
-          <a:lstStyle/>
-          <a:p>
-            <a:pPr algn="ctr"/>
-            <a:endParaRPr lang="pt-PT"/>
-          </a:p>
-        </p:txBody>
-      </p:sp>
-      <p:sp>
-        <p:nvSpPr>
-          <p:cNvPr id="4" name="CaixaDeTexto 3">
-            <a:extLst>
-              <a:ext uri="{FF2B5EF4-FFF2-40B4-BE49-F238E27FC236}">
-                <a16:creationId xmlns:a16="http://schemas.microsoft.com/office/drawing/2014/main" id="{D3649FF5-04AA-4E5C-A44C-3CCD9ADE4C05}"/>
-              </a:ext>
-            </a:extLst>
-          </p:cNvPr>
-          <p:cNvSpPr txBox="1"/>
-          <p:nvPr/>
-        </p:nvSpPr>
-        <p:spPr>
-          <a:xfrm>
-            <a:off x="639199" y="2649492"/>
-            <a:ext cx="2201333" cy="584775"/>
-          </a:xfrm>
-          <a:prstGeom prst="rect">
-            <a:avLst/>
-          </a:prstGeom>
-          <a:noFill/>
-        </p:spPr>
-        <p:txBody>
-          <a:bodyPr wrap="square" rtlCol="0">
-            <a:spAutoFit/>
-          </a:bodyPr>
-          <a:lstStyle/>
-          <a:p>
-            <a:r>
-              <a:rPr lang="pt-PT" sz="3200" i="1" dirty="0" err="1">
-                <a:solidFill>
-                  <a:schemeClr val="bg1">
-                    <a:lumMod val="50000"/>
-                  </a:schemeClr>
-                </a:solidFill>
-                <a:effectLst>
-                  <a:outerShdw blurRad="38100" dist="38100" dir="2700000" algn="tl">
-                    <a:srgbClr val="000000">
-                      <a:alpha val="43137"/>
-                    </a:srgbClr>
-                  </a:outerShdw>
-                </a:effectLst>
-              </a:rPr>
-              <a:t>Profiler</a:t>
-            </a:r>
-            <a:endParaRPr lang="pt-PT" sz="3200" i="1" dirty="0">
-              <a:solidFill>
-                <a:schemeClr val="bg1">
-                  <a:lumMod val="50000"/>
-                </a:schemeClr>
-              </a:solidFill>
-              <a:effectLst>
-                <a:outerShdw blurRad="38100" dist="38100" dir="2700000" algn="tl">
-                  <a:srgbClr val="000000">
-                    <a:alpha val="43137"/>
-                  </a:srgbClr>
-                </a:outerShdw>
-              </a:effectLst>
-            </a:endParaRPr>
-          </a:p>
-        </p:txBody>
-      </p:sp>
-      <p:sp>
-        <p:nvSpPr>
-          <p:cNvPr id="7" name="CaixaDeTexto 6">
-            <a:extLst>
-              <a:ext uri="{FF2B5EF4-FFF2-40B4-BE49-F238E27FC236}">
-                <a16:creationId xmlns:a16="http://schemas.microsoft.com/office/drawing/2014/main" id="{CD680EE5-899C-49B9-8F64-6501BABE3879}"/>
-              </a:ext>
-            </a:extLst>
-          </p:cNvPr>
-          <p:cNvSpPr txBox="1"/>
-          <p:nvPr/>
-        </p:nvSpPr>
-        <p:spPr>
-          <a:xfrm>
-            <a:off x="9990667" y="2649491"/>
-            <a:ext cx="2201333" cy="584775"/>
-          </a:xfrm>
-          <a:prstGeom prst="rect">
-            <a:avLst/>
-          </a:prstGeom>
-          <a:noFill/>
-        </p:spPr>
-        <p:txBody>
-          <a:bodyPr wrap="square" rtlCol="0">
-            <a:spAutoFit/>
-          </a:bodyPr>
-          <a:lstStyle/>
-          <a:p>
-            <a:r>
-              <a:rPr lang="pt-PT" sz="3200" i="1" dirty="0">
-                <a:solidFill>
-                  <a:schemeClr val="bg1">
-                    <a:lumMod val="50000"/>
-                  </a:schemeClr>
-                </a:solidFill>
-                <a:effectLst>
-                  <a:outerShdw blurRad="38100" dist="38100" dir="2700000" algn="tl">
-                    <a:srgbClr val="000000">
-                      <a:alpha val="43137"/>
-                    </a:srgbClr>
-                  </a:outerShdw>
-                </a:effectLst>
-              </a:rPr>
-              <a:t>Interface</a:t>
-            </a:r>
-          </a:p>
-        </p:txBody>
-      </p:sp>
     </p:spTree>
     <p:extLst>
       <p:ext uri="{BB962C8B-B14F-4D97-AF65-F5344CB8AC3E}">
-        <p14:creationId xmlns:p14="http://schemas.microsoft.com/office/powerpoint/2010/main" val="2947764199"/>
+        <p14:creationId xmlns:p14="http://schemas.microsoft.com/office/powerpoint/2010/main" val="3203707965"/>
       </p:ext>
     </p:extLst>
   </p:cSld>
   <p:clrMapOvr>
     <a:masterClrMapping/>
   </p:clrMapOvr>
-  <p:transition spd="slow">
-    <p:cover/>
-  </p:transition>
 </p:sld>
 </file>
 
@@ -7914,10 +7041,10 @@
       </p:grpSpPr>
       <p:sp>
         <p:nvSpPr>
-          <p:cNvPr id="9" name="Título 8">
+          <p:cNvPr id="2" name="Título 1">
             <a:extLst>
               <a:ext uri="{FF2B5EF4-FFF2-40B4-BE49-F238E27FC236}">
-                <a16:creationId xmlns:a16="http://schemas.microsoft.com/office/drawing/2014/main" id="{2242052A-3CCC-4918-9A02-55A0F086A6AC}"/>
+                <a16:creationId xmlns:a16="http://schemas.microsoft.com/office/drawing/2014/main" id="{D7D5C487-DAE2-4B7D-BFE9-AF4871322A8E}"/>
               </a:ext>
             </a:extLst>
           </p:cNvPr>
@@ -7935,17 +7062,17 @@
           <a:p>
             <a:r>
               <a:rPr lang="pt-PT" dirty="0"/>
-              <a:t>Diálogo suportado pelo sistema (exemplo)</a:t>
-            </a:r>
-          </a:p>
-        </p:txBody>
-      </p:sp>
-      <p:sp>
-        <p:nvSpPr>
-          <p:cNvPr id="11" name="Marcador de Posição do Texto 10">
+              <a:t>Funcionamento do Sistema</a:t>
+            </a:r>
+          </a:p>
+        </p:txBody>
+      </p:sp>
+      <p:sp>
+        <p:nvSpPr>
+          <p:cNvPr id="4" name="Marcador de Posição do Texto 3">
             <a:extLst>
               <a:ext uri="{FF2B5EF4-FFF2-40B4-BE49-F238E27FC236}">
-                <a16:creationId xmlns:a16="http://schemas.microsoft.com/office/drawing/2014/main" id="{861DA2B8-2C4C-499C-9373-7AF65343E67A}"/>
+                <a16:creationId xmlns:a16="http://schemas.microsoft.com/office/drawing/2014/main" id="{417E3BDF-5D19-4BAF-AEB7-734DBFCE7AA0}"/>
               </a:ext>
             </a:extLst>
           </p:cNvPr>
@@ -7956,86 +7083,63 @@
             <p:ph type="body" sz="half" idx="2"/>
           </p:nvPr>
         </p:nvSpPr>
-        <p:spPr/>
+        <p:spPr>
+          <a:xfrm>
+            <a:off x="457200" y="2858701"/>
+            <a:ext cx="3441032" cy="3746925"/>
+          </a:xfrm>
+        </p:spPr>
+        <p:txBody>
+          <a:bodyPr>
+            <a:normAutofit/>
+          </a:bodyPr>
+          <a:lstStyle/>
+          <a:p>
+            <a:pPr>
+              <a:lnSpc>
+                <a:spcPct val="120000"/>
+              </a:lnSpc>
+            </a:pPr>
+            <a:endParaRPr lang="sv-SE" sz="5200" dirty="0"/>
+          </a:p>
+        </p:txBody>
+      </p:sp>
+      <p:sp>
+        <p:nvSpPr>
+          <p:cNvPr id="20" name="Marcador de Posição de Conteúdo 19">
+            <a:extLst>
+              <a:ext uri="{FF2B5EF4-FFF2-40B4-BE49-F238E27FC236}">
+                <a16:creationId xmlns:a16="http://schemas.microsoft.com/office/drawing/2014/main" id="{E6D76E72-3E5E-4298-ADA6-0607B4B80320}"/>
+              </a:ext>
+            </a:extLst>
+          </p:cNvPr>
+          <p:cNvSpPr>
+            <a:spLocks noGrp="1"/>
+          </p:cNvSpPr>
+          <p:nvPr>
+            <p:ph idx="1"/>
+          </p:nvPr>
+        </p:nvSpPr>
+        <p:spPr>
+          <a:xfrm>
+            <a:off x="4800600" y="1911352"/>
+            <a:ext cx="6492240" cy="4077967"/>
+          </a:xfrm>
+        </p:spPr>
         <p:txBody>
           <a:bodyPr/>
           <a:lstStyle/>
           <a:p>
-            <a:r>
-              <a:rPr lang="pt-PT" dirty="0"/>
-              <a:t>Leonardo: Então Einstein, vamos a</a:t>
-            </a:r>
-            <a:br>
-              <a:rPr lang="pt-PT" dirty="0"/>
-            </a:br>
-            <a:r>
-              <a:rPr lang="pt-PT" dirty="0"/>
-              <a:t>                   mais um teste?</a:t>
-            </a:r>
-            <a:br>
-              <a:rPr lang="pt-PT" dirty="0"/>
-            </a:br>
-            <a:r>
-              <a:rPr lang="pt-PT" dirty="0"/>
-              <a:t>Utilizador: Eu sei tudo!</a:t>
-            </a:r>
-            <a:br>
-              <a:rPr lang="pt-PT" dirty="0"/>
-            </a:br>
-            <a:r>
-              <a:rPr lang="pt-PT" dirty="0"/>
-              <a:t>Leonardo : Escolhe o tema para</a:t>
-            </a:r>
-            <a:br>
-              <a:rPr lang="pt-PT" dirty="0"/>
-            </a:br>
-            <a:r>
-              <a:rPr lang="pt-PT" dirty="0"/>
-              <a:t>                    avaliação.</a:t>
-            </a:r>
-            <a:br>
-              <a:rPr lang="pt-PT" dirty="0"/>
-            </a:br>
             <a:endParaRPr lang="pt-PT" dirty="0"/>
-          </a:p>
-          <a:p>
-            <a:r>
-              <a:rPr lang="pt-PT" dirty="0"/>
-              <a:t>(…)</a:t>
-            </a:r>
-            <a:br>
-              <a:rPr lang="pt-PT" dirty="0"/>
-            </a:br>
-            <a:r>
-              <a:rPr lang="pt-PT" dirty="0"/>
-              <a:t>* Aluno realiza um teste e termina com boa performance *</a:t>
-            </a:r>
-            <a:br>
-              <a:rPr lang="pt-PT" dirty="0"/>
-            </a:br>
-            <a:r>
-              <a:rPr lang="pt-PT" dirty="0"/>
-              <a:t>(…)</a:t>
-            </a:r>
-            <a:br>
-              <a:rPr lang="pt-PT" dirty="0"/>
-            </a:br>
-            <a:br>
-              <a:rPr lang="pt-PT" dirty="0"/>
-            </a:br>
-            <a:r>
-              <a:rPr lang="pt-PT" dirty="0"/>
-              <a:t>Leonardo: É para o 20.</a:t>
-            </a:r>
           </a:p>
         </p:txBody>
       </p:sp>
       <p:pic>
         <p:nvPicPr>
-          <p:cNvPr id="6" name="Imagem 5">
+          <p:cNvPr id="22" name="Marcador de Posição de Conteúdo 9" descr="Uma imagem com captura de ecrã&#10;&#10;Descrição gerada automaticamente">
             <a:extLst>
               <a:ext uri="{FF2B5EF4-FFF2-40B4-BE49-F238E27FC236}">
-                <a16:creationId xmlns:a16="http://schemas.microsoft.com/office/drawing/2014/main" id="{29C326E9-55EA-47E8-8815-2DF28E56CE08}"/>
+                <a16:creationId xmlns:a16="http://schemas.microsoft.com/office/drawing/2014/main" id="{50375737-C7DA-43B7-A2F5-C20ED74572B3}"/>
               </a:ext>
             </a:extLst>
           </p:cNvPr>
@@ -8045,7 +7149,7 @@
           <p:nvPr/>
         </p:nvPicPr>
         <p:blipFill>
-          <a:blip r:embed="rId3">
+          <a:blip r:embed="rId2">
             <a:extLst>
               <a:ext uri="{28A0092B-C50C-407E-A947-70E740481C1C}">
                 <a14:useLocalDpi xmlns:a14="http://schemas.microsoft.com/office/drawing/2010/main" val="0"/>
@@ -8058,63 +7162,130 @@
         </p:blipFill>
         <p:spPr>
           <a:xfrm>
-            <a:off x="4257858" y="0"/>
-            <a:ext cx="4852275" cy="3641535"/>
+            <a:off x="4696327" y="252372"/>
+            <a:ext cx="6625388" cy="6353255"/>
           </a:xfrm>
           <a:prstGeom prst="rect">
             <a:avLst/>
           </a:prstGeom>
         </p:spPr>
       </p:pic>
-      <p:pic>
-        <p:nvPicPr>
-          <p:cNvPr id="8" name="Imagem 7">
+      <p:sp>
+        <p:nvSpPr>
+          <p:cNvPr id="10" name="Retângulo 9">
             <a:extLst>
               <a:ext uri="{FF2B5EF4-FFF2-40B4-BE49-F238E27FC236}">
-                <a16:creationId xmlns:a16="http://schemas.microsoft.com/office/drawing/2014/main" id="{1E4737B7-0097-4870-AF81-03E8531FC890}"/>
+                <a16:creationId xmlns:a16="http://schemas.microsoft.com/office/drawing/2014/main" id="{A48B53B7-60D8-40F1-A968-DBEEB42C819B}"/>
               </a:ext>
             </a:extLst>
           </p:cNvPr>
-          <p:cNvPicPr>
-            <a:picLocks noChangeAspect="1"/>
-          </p:cNvPicPr>
+          <p:cNvSpPr/>
           <p:nvPr/>
-        </p:nvPicPr>
-        <p:blipFill>
-          <a:blip r:embed="rId4">
-            <a:extLst>
-              <a:ext uri="{28A0092B-C50C-407E-A947-70E740481C1C}">
-                <a14:useLocalDpi xmlns:a14="http://schemas.microsoft.com/office/drawing/2010/main" val="0"/>
-              </a:ext>
-            </a:extLst>
-          </a:blip>
-          <a:stretch>
-            <a:fillRect/>
-          </a:stretch>
-        </p:blipFill>
-        <p:spPr>
-          <a:xfrm>
-            <a:off x="4299315" y="3641535"/>
-            <a:ext cx="5072409" cy="3198816"/>
+        </p:nvSpPr>
+        <p:spPr>
+          <a:xfrm>
+            <a:off x="8866496" y="2067635"/>
+            <a:ext cx="218364" cy="141027"/>
           </a:xfrm>
           <a:prstGeom prst="rect">
             <a:avLst/>
           </a:prstGeom>
-        </p:spPr>
-      </p:pic>
+          <a:solidFill>
+            <a:schemeClr val="bg1"/>
+          </a:solidFill>
+          <a:ln>
+            <a:solidFill>
+              <a:schemeClr val="bg1"/>
+            </a:solidFill>
+          </a:ln>
+        </p:spPr>
+        <p:style>
+          <a:lnRef idx="2">
+            <a:schemeClr val="accent1">
+              <a:shade val="50000"/>
+            </a:schemeClr>
+          </a:lnRef>
+          <a:fillRef idx="1">
+            <a:schemeClr val="accent1"/>
+          </a:fillRef>
+          <a:effectRef idx="0">
+            <a:schemeClr val="accent1"/>
+          </a:effectRef>
+          <a:fontRef idx="minor">
+            <a:schemeClr val="lt1"/>
+          </a:fontRef>
+        </p:style>
+        <p:txBody>
+          <a:bodyPr rtlCol="0" anchor="ctr"/>
+          <a:lstStyle/>
+          <a:p>
+            <a:pPr algn="ctr"/>
+            <a:endParaRPr lang="pt-PT"/>
+          </a:p>
+        </p:txBody>
+      </p:sp>
+      <p:cxnSp>
+        <p:nvCxnSpPr>
+          <p:cNvPr id="7" name="Conexão reta unidirecional 6">
+            <a:extLst>
+              <a:ext uri="{FF2B5EF4-FFF2-40B4-BE49-F238E27FC236}">
+                <a16:creationId xmlns:a16="http://schemas.microsoft.com/office/drawing/2014/main" id="{23FAA8B1-6CD6-4A4F-98FE-42B55C13F874}"/>
+              </a:ext>
+            </a:extLst>
+          </p:cNvPr>
+          <p:cNvCxnSpPr>
+            <a:cxnSpLocks/>
+          </p:cNvCxnSpPr>
+          <p:nvPr/>
+        </p:nvCxnSpPr>
+        <p:spPr>
+          <a:xfrm>
+            <a:off x="7751928" y="2138149"/>
+            <a:ext cx="1378424" cy="0"/>
+          </a:xfrm>
+          <a:prstGeom prst="straightConnector1">
+            <a:avLst/>
+          </a:prstGeom>
+          <a:ln w="28575">
+            <a:solidFill>
+              <a:srgbClr val="FF3300"/>
+            </a:solidFill>
+            <a:tailEnd type="triangle"/>
+          </a:ln>
+          <a:effectLst>
+            <a:glow rad="63500">
+              <a:schemeClr val="accent2">
+                <a:satMod val="175000"/>
+                <a:alpha val="40000"/>
+              </a:schemeClr>
+            </a:glow>
+          </a:effectLst>
+        </p:spPr>
+        <p:style>
+          <a:lnRef idx="1">
+            <a:schemeClr val="accent1"/>
+          </a:lnRef>
+          <a:fillRef idx="0">
+            <a:schemeClr val="accent1"/>
+          </a:fillRef>
+          <a:effectRef idx="0">
+            <a:schemeClr val="accent1"/>
+          </a:effectRef>
+          <a:fontRef idx="minor">
+            <a:schemeClr val="tx1"/>
+          </a:fontRef>
+        </p:style>
+      </p:cxnSp>
     </p:spTree>
     <p:extLst>
       <p:ext uri="{BB962C8B-B14F-4D97-AF65-F5344CB8AC3E}">
-        <p14:creationId xmlns:p14="http://schemas.microsoft.com/office/powerpoint/2010/main" val="2018381725"/>
+        <p14:creationId xmlns:p14="http://schemas.microsoft.com/office/powerpoint/2010/main" val="1476461664"/>
       </p:ext>
     </p:extLst>
   </p:cSld>
   <p:clrMapOvr>
     <a:masterClrMapping/>
   </p:clrMapOvr>
-  <p:transition spd="slow">
-    <p:cover/>
-  </p:transition>
 </p:sld>
 </file>
 
@@ -8140,7 +7311,7 @@
           <p:cNvPr id="2" name="Título 1">
             <a:extLst>
               <a:ext uri="{FF2B5EF4-FFF2-40B4-BE49-F238E27FC236}">
-                <a16:creationId xmlns:a16="http://schemas.microsoft.com/office/drawing/2014/main" id="{D6A7957C-DC5E-4548-8077-D8829D44F171}"/>
+                <a16:creationId xmlns:a16="http://schemas.microsoft.com/office/drawing/2014/main" id="{D7D5C487-DAE2-4B7D-BFE9-AF4871322A8E}"/>
               </a:ext>
             </a:extLst>
           </p:cNvPr>
@@ -8157,24 +7328,85 @@
           <a:lstStyle/>
           <a:p>
             <a:r>
-              <a:rPr lang="pt-PT" dirty="0">
-                <a:solidFill>
-                  <a:schemeClr val="bg1">
-                    <a:lumMod val="50000"/>
-                  </a:schemeClr>
-                </a:solidFill>
-              </a:rPr>
-              <a:t>Ferramentas utilizadas</a:t>
-            </a:r>
+              <a:rPr lang="pt-PT" dirty="0"/>
+              <a:t>Funcionamento do Sistema</a:t>
+            </a:r>
+          </a:p>
+        </p:txBody>
+      </p:sp>
+      <p:sp>
+        <p:nvSpPr>
+          <p:cNvPr id="4" name="Marcador de Posição do Texto 3">
+            <a:extLst>
+              <a:ext uri="{FF2B5EF4-FFF2-40B4-BE49-F238E27FC236}">
+                <a16:creationId xmlns:a16="http://schemas.microsoft.com/office/drawing/2014/main" id="{417E3BDF-5D19-4BAF-AEB7-734DBFCE7AA0}"/>
+              </a:ext>
+            </a:extLst>
+          </p:cNvPr>
+          <p:cNvSpPr>
+            <a:spLocks noGrp="1"/>
+          </p:cNvSpPr>
+          <p:nvPr>
+            <p:ph type="body" sz="half" idx="2"/>
+          </p:nvPr>
+        </p:nvSpPr>
+        <p:spPr>
+          <a:xfrm>
+            <a:off x="457200" y="2858701"/>
+            <a:ext cx="3441032" cy="3746925"/>
+          </a:xfrm>
+        </p:spPr>
+        <p:txBody>
+          <a:bodyPr>
+            <a:normAutofit/>
+          </a:bodyPr>
+          <a:lstStyle/>
+          <a:p>
+            <a:pPr>
+              <a:lnSpc>
+                <a:spcPct val="120000"/>
+              </a:lnSpc>
+            </a:pPr>
+            <a:endParaRPr lang="sv-SE" sz="5200" dirty="0"/>
+          </a:p>
+        </p:txBody>
+      </p:sp>
+      <p:sp>
+        <p:nvSpPr>
+          <p:cNvPr id="20" name="Marcador de Posição de Conteúdo 19">
+            <a:extLst>
+              <a:ext uri="{FF2B5EF4-FFF2-40B4-BE49-F238E27FC236}">
+                <a16:creationId xmlns:a16="http://schemas.microsoft.com/office/drawing/2014/main" id="{E6D76E72-3E5E-4298-ADA6-0607B4B80320}"/>
+              </a:ext>
+            </a:extLst>
+          </p:cNvPr>
+          <p:cNvSpPr>
+            <a:spLocks noGrp="1"/>
+          </p:cNvSpPr>
+          <p:nvPr>
+            <p:ph idx="1"/>
+          </p:nvPr>
+        </p:nvSpPr>
+        <p:spPr>
+          <a:xfrm>
+            <a:off x="4800600" y="1911352"/>
+            <a:ext cx="6492240" cy="4077967"/>
+          </a:xfrm>
+        </p:spPr>
+        <p:txBody>
+          <a:bodyPr/>
+          <a:lstStyle/>
+          <a:p>
+            <a:endParaRPr lang="pt-PT" dirty="0"/>
           </a:p>
         </p:txBody>
       </p:sp>
       <p:pic>
         <p:nvPicPr>
-          <p:cNvPr id="5" name="Imagem 4">
+          <p:cNvPr id="22" name="Marcador de Posição de Conteúdo 9" descr="Uma imagem com captura de ecrã&#10;&#10;Descrição gerada automaticamente">
             <a:extLst>
               <a:ext uri="{FF2B5EF4-FFF2-40B4-BE49-F238E27FC236}">
-                <a16:creationId xmlns:a16="http://schemas.microsoft.com/office/drawing/2014/main" id="{314C4566-E3D5-4C54-8686-5B9ECE2D9E35}"/>
+                <a16:creationId xmlns:a16="http://schemas.microsoft.com/office/drawing/2014/main" id="{50375737-C7DA-43B7-A2F5-C20ED74572B3}"/>
               </a:ext>
             </a:extLst>
           </p:cNvPr>
@@ -8184,7 +7416,7 @@
           <p:nvPr/>
         </p:nvPicPr>
         <p:blipFill>
-          <a:blip r:embed="rId3">
+          <a:blip r:embed="rId2">
             <a:extLst>
               <a:ext uri="{28A0092B-C50C-407E-A947-70E740481C1C}">
                 <a14:useLocalDpi xmlns:a14="http://schemas.microsoft.com/office/drawing/2010/main" val="0"/>
@@ -8197,135 +7429,130 @@
         </p:blipFill>
         <p:spPr>
           <a:xfrm>
-            <a:off x="6781586" y="4431467"/>
-            <a:ext cx="4162425" cy="1095375"/>
+            <a:off x="4696327" y="252372"/>
+            <a:ext cx="6625388" cy="6353255"/>
           </a:xfrm>
           <a:prstGeom prst="rect">
             <a:avLst/>
           </a:prstGeom>
         </p:spPr>
       </p:pic>
-      <p:pic>
-        <p:nvPicPr>
-          <p:cNvPr id="7" name="Imagem 6">
+      <p:sp>
+        <p:nvSpPr>
+          <p:cNvPr id="17" name="Retângulo 16">
             <a:extLst>
               <a:ext uri="{FF2B5EF4-FFF2-40B4-BE49-F238E27FC236}">
-                <a16:creationId xmlns:a16="http://schemas.microsoft.com/office/drawing/2014/main" id="{896B0D0B-613F-40CF-9E5B-ED2D0E0E299E}"/>
+                <a16:creationId xmlns:a16="http://schemas.microsoft.com/office/drawing/2014/main" id="{33E9C5B0-2D92-4B6A-9A94-54E23E51FA04}"/>
               </a:ext>
             </a:extLst>
           </p:cNvPr>
-          <p:cNvPicPr>
-            <a:picLocks noChangeAspect="1"/>
-          </p:cNvPicPr>
+          <p:cNvSpPr/>
           <p:nvPr/>
-        </p:nvPicPr>
-        <p:blipFill>
-          <a:blip r:embed="rId4">
-            <a:extLst>
-              <a:ext uri="{28A0092B-C50C-407E-A947-70E740481C1C}">
-                <a14:useLocalDpi xmlns:a14="http://schemas.microsoft.com/office/drawing/2010/main" val="0"/>
-              </a:ext>
-            </a:extLst>
-          </a:blip>
-          <a:stretch>
-            <a:fillRect/>
-          </a:stretch>
-        </p:blipFill>
-        <p:spPr>
-          <a:xfrm>
-            <a:off x="6857359" y="1827256"/>
-            <a:ext cx="3664800" cy="1752730"/>
+        </p:nvSpPr>
+        <p:spPr>
+          <a:xfrm>
+            <a:off x="7772400" y="2233613"/>
+            <a:ext cx="166688" cy="138112"/>
           </a:xfrm>
           <a:prstGeom prst="rect">
             <a:avLst/>
           </a:prstGeom>
-        </p:spPr>
-      </p:pic>
-      <p:pic>
-        <p:nvPicPr>
-          <p:cNvPr id="9" name="Imagem 8">
+          <a:solidFill>
+            <a:schemeClr val="bg1"/>
+          </a:solidFill>
+          <a:ln>
+            <a:solidFill>
+              <a:schemeClr val="bg1"/>
+            </a:solidFill>
+          </a:ln>
+        </p:spPr>
+        <p:style>
+          <a:lnRef idx="2">
+            <a:schemeClr val="accent1">
+              <a:shade val="50000"/>
+            </a:schemeClr>
+          </a:lnRef>
+          <a:fillRef idx="1">
+            <a:schemeClr val="accent1"/>
+          </a:fillRef>
+          <a:effectRef idx="0">
+            <a:schemeClr val="accent1"/>
+          </a:effectRef>
+          <a:fontRef idx="minor">
+            <a:schemeClr val="lt1"/>
+          </a:fontRef>
+        </p:style>
+        <p:txBody>
+          <a:bodyPr rtlCol="0" anchor="ctr"/>
+          <a:lstStyle/>
+          <a:p>
+            <a:pPr algn="ctr"/>
+            <a:endParaRPr lang="pt-PT"/>
+          </a:p>
+        </p:txBody>
+      </p:sp>
+      <p:cxnSp>
+        <p:nvCxnSpPr>
+          <p:cNvPr id="19" name="Conexão reta unidirecional 18">
             <a:extLst>
               <a:ext uri="{FF2B5EF4-FFF2-40B4-BE49-F238E27FC236}">
-                <a16:creationId xmlns:a16="http://schemas.microsoft.com/office/drawing/2014/main" id="{36CC0437-23EE-4BD1-ADC3-A33696204AFF}"/>
+                <a16:creationId xmlns:a16="http://schemas.microsoft.com/office/drawing/2014/main" id="{B1A1F4BA-9D68-4455-93BE-D4DBE505ACE6}"/>
               </a:ext>
             </a:extLst>
           </p:cNvPr>
-          <p:cNvPicPr>
-            <a:picLocks noChangeAspect="1"/>
-          </p:cNvPicPr>
+          <p:cNvCxnSpPr>
+            <a:cxnSpLocks/>
+          </p:cNvCxnSpPr>
           <p:nvPr/>
-        </p:nvPicPr>
-        <p:blipFill>
-          <a:blip r:embed="rId5" cstate="hqprint">
-            <a:extLst>
-              <a:ext uri="{28A0092B-C50C-407E-A947-70E740481C1C}">
-                <a14:useLocalDpi xmlns:a14="http://schemas.microsoft.com/office/drawing/2010/main" val="0"/>
-              </a:ext>
-            </a:extLst>
-          </a:blip>
-          <a:stretch>
-            <a:fillRect/>
-          </a:stretch>
-        </p:blipFill>
-        <p:spPr>
-          <a:xfrm>
-            <a:off x="1038300" y="2022537"/>
-            <a:ext cx="4296342" cy="1450757"/>
-          </a:xfrm>
-          <a:prstGeom prst="rect">
+        </p:nvCxnSpPr>
+        <p:spPr>
+          <a:xfrm flipH="1">
+            <a:off x="7735195" y="2301431"/>
+            <a:ext cx="1376362" cy="0"/>
+          </a:xfrm>
+          <a:prstGeom prst="straightConnector1">
             <a:avLst/>
           </a:prstGeom>
-        </p:spPr>
-      </p:pic>
-      <p:pic>
-        <p:nvPicPr>
-          <p:cNvPr id="11" name="Imagem 10">
-            <a:extLst>
-              <a:ext uri="{FF2B5EF4-FFF2-40B4-BE49-F238E27FC236}">
-                <a16:creationId xmlns:a16="http://schemas.microsoft.com/office/drawing/2014/main" id="{56C23E1A-3E18-429C-9802-D27661FD0B1C}"/>
-              </a:ext>
-            </a:extLst>
-          </p:cNvPr>
-          <p:cNvPicPr>
-            <a:picLocks noChangeAspect="1"/>
-          </p:cNvPicPr>
-          <p:nvPr/>
-        </p:nvPicPr>
-        <p:blipFill>
-          <a:blip r:embed="rId6">
-            <a:extLst>
-              <a:ext uri="{28A0092B-C50C-407E-A947-70E740481C1C}">
-                <a14:useLocalDpi xmlns:a14="http://schemas.microsoft.com/office/drawing/2010/main" val="0"/>
-              </a:ext>
-            </a:extLst>
-          </a:blip>
-          <a:stretch>
-            <a:fillRect/>
-          </a:stretch>
-        </p:blipFill>
-        <p:spPr>
-          <a:xfrm>
-            <a:off x="1301122" y="3579986"/>
-            <a:ext cx="4033520" cy="2016760"/>
-          </a:xfrm>
-          <a:prstGeom prst="rect">
-            <a:avLst/>
-          </a:prstGeom>
-        </p:spPr>
-      </p:pic>
+          <a:ln w="28575">
+            <a:solidFill>
+              <a:srgbClr val="FF3300"/>
+            </a:solidFill>
+            <a:tailEnd type="triangle"/>
+          </a:ln>
+          <a:effectLst>
+            <a:glow rad="63500">
+              <a:schemeClr val="accent2">
+                <a:satMod val="175000"/>
+                <a:alpha val="40000"/>
+              </a:schemeClr>
+            </a:glow>
+          </a:effectLst>
+        </p:spPr>
+        <p:style>
+          <a:lnRef idx="1">
+            <a:schemeClr val="accent1"/>
+          </a:lnRef>
+          <a:fillRef idx="0">
+            <a:schemeClr val="accent1"/>
+          </a:fillRef>
+          <a:effectRef idx="0">
+            <a:schemeClr val="accent1"/>
+          </a:effectRef>
+          <a:fontRef idx="minor">
+            <a:schemeClr val="tx1"/>
+          </a:fontRef>
+        </p:style>
+      </p:cxnSp>
     </p:spTree>
     <p:extLst>
       <p:ext uri="{BB962C8B-B14F-4D97-AF65-F5344CB8AC3E}">
-        <p14:creationId xmlns:p14="http://schemas.microsoft.com/office/powerpoint/2010/main" val="1279032532"/>
+        <p14:creationId xmlns:p14="http://schemas.microsoft.com/office/powerpoint/2010/main" val="3176708937"/>
       </p:ext>
     </p:extLst>
   </p:cSld>
   <p:clrMapOvr>
     <a:masterClrMapping/>
   </p:clrMapOvr>
-  <p:transition spd="slow">
-    <p:cover/>
-  </p:transition>
 </p:sld>
 </file>
 

</xml_diff>